<commit_message>
[UPDATE] presentation & PDF
</commit_message>
<xml_diff>
--- a/Practice/Chap4/Chap4.Mathematical_Function.pptx
+++ b/Practice/Chap4/Chap4.Mathematical_Function.pptx
@@ -17,9 +17,11 @@
     <p:sldId id="290" r:id="rId11"/>
     <p:sldId id="291" r:id="rId12"/>
     <p:sldId id="292" r:id="rId13"/>
-    <p:sldId id="279" r:id="rId14"/>
-    <p:sldId id="278" r:id="rId15"/>
-    <p:sldId id="263" r:id="rId16"/>
+    <p:sldId id="294" r:id="rId14"/>
+    <p:sldId id="293" r:id="rId15"/>
+    <p:sldId id="279" r:id="rId16"/>
+    <p:sldId id="278" r:id="rId17"/>
+    <p:sldId id="263" r:id="rId18"/>
   </p:sldIdLst>
   <p:sldSz cx="12192000" cy="6858000"/>
   <p:notesSz cx="6858000" cy="9144000"/>
@@ -9818,6 +9820,2438 @@
       </p:grpSp>
       <p:sp>
         <p:nvSpPr>
+          <p:cNvPr id="25" name="TextBox 24">
+            <a:extLst>
+              <a:ext uri="{FF2B5EF4-FFF2-40B4-BE49-F238E27FC236}">
+                <a16:creationId xmlns:a16="http://schemas.microsoft.com/office/drawing/2014/main" id="{8C182DCE-9ABA-C223-83A9-C0965E0CC853}"/>
+              </a:ext>
+            </a:extLst>
+          </p:cNvPr>
+          <p:cNvSpPr txBox="1"/>
+          <p:nvPr/>
+        </p:nvSpPr>
+        <p:spPr>
+          <a:xfrm>
+            <a:off x="1754746" y="572134"/>
+            <a:ext cx="4659190" cy="400110"/>
+          </a:xfrm>
+          <a:prstGeom prst="rect">
+            <a:avLst/>
+          </a:prstGeom>
+          <a:noFill/>
+        </p:spPr>
+        <p:txBody>
+          <a:bodyPr wrap="square">
+            <a:spAutoFit/>
+          </a:bodyPr>
+          <a:lstStyle/>
+          <a:p>
+            <a:pPr marL="0" lvl="1" indent="-457200">
+              <a:defRPr/>
+            </a:pPr>
+            <a:r>
+              <a:rPr lang="en-US" altLang="ko-KR" sz="2000" b="1" i="1" kern="0" dirty="0">
+                <a:ln w="15875">
+                  <a:noFill/>
+                </a:ln>
+                <a:solidFill>
+                  <a:prstClr val="white">
+                    <a:lumMod val="75000"/>
+                  </a:prstClr>
+                </a:solidFill>
+                <a:latin typeface="Tmon몬소리 Black" panose="02000A03000000000000" pitchFamily="2" charset="-127"/>
+                <a:ea typeface="Tmon몬소리 Black" panose="02000A03000000000000" pitchFamily="2" charset="-127"/>
+              </a:rPr>
+              <a:t>Question 2</a:t>
+            </a:r>
+          </a:p>
+        </p:txBody>
+      </p:sp>
+      <p:pic>
+        <p:nvPicPr>
+          <p:cNvPr id="7" name="Picture 6">
+            <a:extLst>
+              <a:ext uri="{FF2B5EF4-FFF2-40B4-BE49-F238E27FC236}">
+                <a16:creationId xmlns:a16="http://schemas.microsoft.com/office/drawing/2014/main" id="{630E590E-FD03-6803-ED58-E94CB72ECA9E}"/>
+              </a:ext>
+            </a:extLst>
+          </p:cNvPr>
+          <p:cNvPicPr>
+            <a:picLocks noChangeAspect="1"/>
+          </p:cNvPicPr>
+          <p:nvPr/>
+        </p:nvPicPr>
+        <p:blipFill>
+          <a:blip r:embed="rId2"/>
+          <a:stretch>
+            <a:fillRect/>
+          </a:stretch>
+        </p:blipFill>
+        <p:spPr>
+          <a:xfrm>
+            <a:off x="598259" y="1568922"/>
+            <a:ext cx="8563356" cy="1647536"/>
+          </a:xfrm>
+          <a:prstGeom prst="rect">
+            <a:avLst/>
+          </a:prstGeom>
+        </p:spPr>
+      </p:pic>
+    </p:spTree>
+    <p:extLst>
+      <p:ext uri="{BB962C8B-B14F-4D97-AF65-F5344CB8AC3E}">
+        <p14:creationId xmlns:p14="http://schemas.microsoft.com/office/powerpoint/2010/main" val="4198575706"/>
+      </p:ext>
+    </p:extLst>
+  </p:cSld>
+  <p:clrMapOvr>
+    <a:masterClrMapping/>
+  </p:clrMapOvr>
+</p:sld>
+</file>
+
+<file path=ppt/slides/slide14.xml><?xml version="1.0" encoding="utf-8"?>
+<p:sld xmlns:a="http://schemas.openxmlformats.org/drawingml/2006/main" xmlns:r="http://schemas.openxmlformats.org/officeDocument/2006/relationships" xmlns:p="http://schemas.openxmlformats.org/presentationml/2006/main">
+  <p:cSld>
+    <p:bg>
+      <p:bgPr>
+        <a:solidFill>
+          <a:srgbClr val="FFEDCD"/>
+        </a:solidFill>
+        <a:effectLst/>
+      </p:bgPr>
+    </p:bg>
+    <p:spTree>
+      <p:nvGrpSpPr>
+        <p:cNvPr id="1" name=""/>
+        <p:cNvGrpSpPr/>
+        <p:nvPr/>
+      </p:nvGrpSpPr>
+      <p:grpSpPr>
+        <a:xfrm>
+          <a:off x="0" y="0"/>
+          <a:ext cx="0" cy="0"/>
+          <a:chOff x="0" y="0"/>
+          <a:chExt cx="0" cy="0"/>
+        </a:xfrm>
+      </p:grpSpPr>
+      <p:grpSp>
+        <p:nvGrpSpPr>
+          <p:cNvPr id="20" name="그룹 19">
+            <a:extLst>
+              <a:ext uri="{FF2B5EF4-FFF2-40B4-BE49-F238E27FC236}">
+                <a16:creationId xmlns:a16="http://schemas.microsoft.com/office/drawing/2014/main" id="{FB6328CA-21F0-2C1D-7F52-4745C714636D}"/>
+              </a:ext>
+            </a:extLst>
+          </p:cNvPr>
+          <p:cNvGrpSpPr/>
+          <p:nvPr/>
+        </p:nvGrpSpPr>
+        <p:grpSpPr>
+          <a:xfrm>
+            <a:off x="455384" y="-31785"/>
+            <a:ext cx="11393190" cy="1428547"/>
+            <a:chOff x="455384" y="-31785"/>
+            <a:chExt cx="11393190" cy="1428547"/>
+          </a:xfrm>
+        </p:grpSpPr>
+        <p:sp>
+          <p:nvSpPr>
+            <p:cNvPr id="16" name="자유형: 도형 15">
+              <a:extLst>
+                <a:ext uri="{FF2B5EF4-FFF2-40B4-BE49-F238E27FC236}">
+                  <a16:creationId xmlns:a16="http://schemas.microsoft.com/office/drawing/2014/main" id="{E64C6551-745E-CC85-F1B5-777E1217912F}"/>
+                </a:ext>
+              </a:extLst>
+            </p:cNvPr>
+            <p:cNvSpPr/>
+            <p:nvPr/>
+          </p:nvSpPr>
+          <p:spPr>
+            <a:xfrm>
+              <a:off x="455384" y="-1"/>
+              <a:ext cx="11393190" cy="1144019"/>
+            </a:xfrm>
+            <a:custGeom>
+              <a:avLst/>
+              <a:gdLst>
+                <a:gd name="connsiteX0" fmla="*/ 10221266 w 11393190"/>
+                <a:gd name="connsiteY0" fmla="*/ 0 h 1144019"/>
+                <a:gd name="connsiteX1" fmla="*/ 11393190 w 11393190"/>
+                <a:gd name="connsiteY1" fmla="*/ 0 h 1144019"/>
+                <a:gd name="connsiteX2" fmla="*/ 10284025 w 11393190"/>
+                <a:gd name="connsiteY2" fmla="*/ 1109165 h 1144019"/>
+                <a:gd name="connsiteX3" fmla="*/ 10206573 w 11393190"/>
+                <a:gd name="connsiteY3" fmla="*/ 1141247 h 1144019"/>
+                <a:gd name="connsiteX4" fmla="*/ 10203593 w 11393190"/>
+                <a:gd name="connsiteY4" fmla="*/ 1140667 h 1144019"/>
+                <a:gd name="connsiteX5" fmla="*/ 10186991 w 11393190"/>
+                <a:gd name="connsiteY5" fmla="*/ 1144019 h 1144019"/>
+                <a:gd name="connsiteX6" fmla="*/ 109534 w 11393190"/>
+                <a:gd name="connsiteY6" fmla="*/ 1144019 h 1144019"/>
+                <a:gd name="connsiteX7" fmla="*/ 0 w 11393190"/>
+                <a:gd name="connsiteY7" fmla="*/ 1034485 h 1144019"/>
+                <a:gd name="connsiteX8" fmla="*/ 0 w 11393190"/>
+                <a:gd name="connsiteY8" fmla="*/ 424878 h 1144019"/>
+                <a:gd name="connsiteX9" fmla="*/ 109534 w 11393190"/>
+                <a:gd name="connsiteY9" fmla="*/ 315344 h 1144019"/>
+                <a:gd name="connsiteX10" fmla="*/ 9905922 w 11393190"/>
+                <a:gd name="connsiteY10" fmla="*/ 315344 h 1144019"/>
+              </a:gdLst>
+              <a:ahLst/>
+              <a:cxnLst>
+                <a:cxn ang="0">
+                  <a:pos x="connsiteX0" y="connsiteY0"/>
+                </a:cxn>
+                <a:cxn ang="0">
+                  <a:pos x="connsiteX1" y="connsiteY1"/>
+                </a:cxn>
+                <a:cxn ang="0">
+                  <a:pos x="connsiteX2" y="connsiteY2"/>
+                </a:cxn>
+                <a:cxn ang="0">
+                  <a:pos x="connsiteX3" y="connsiteY3"/>
+                </a:cxn>
+                <a:cxn ang="0">
+                  <a:pos x="connsiteX4" y="connsiteY4"/>
+                </a:cxn>
+                <a:cxn ang="0">
+                  <a:pos x="connsiteX5" y="connsiteY5"/>
+                </a:cxn>
+                <a:cxn ang="0">
+                  <a:pos x="connsiteX6" y="connsiteY6"/>
+                </a:cxn>
+                <a:cxn ang="0">
+                  <a:pos x="connsiteX7" y="connsiteY7"/>
+                </a:cxn>
+                <a:cxn ang="0">
+                  <a:pos x="connsiteX8" y="connsiteY8"/>
+                </a:cxn>
+                <a:cxn ang="0">
+                  <a:pos x="connsiteX9" y="connsiteY9"/>
+                </a:cxn>
+                <a:cxn ang="0">
+                  <a:pos x="connsiteX10" y="connsiteY10"/>
+                </a:cxn>
+              </a:cxnLst>
+              <a:rect l="l" t="t" r="r" b="b"/>
+              <a:pathLst>
+                <a:path w="11393190" h="1144019">
+                  <a:moveTo>
+                    <a:pt x="10221266" y="0"/>
+                  </a:moveTo>
+                  <a:lnTo>
+                    <a:pt x="11393190" y="0"/>
+                  </a:lnTo>
+                  <a:lnTo>
+                    <a:pt x="10284025" y="1109165"/>
+                  </a:lnTo>
+                  <a:cubicBezTo>
+                    <a:pt x="10262637" y="1130553"/>
+                    <a:pt x="10234605" y="1141247"/>
+                    <a:pt x="10206573" y="1141247"/>
+                  </a:cubicBezTo>
+                  <a:lnTo>
+                    <a:pt x="10203593" y="1140667"/>
+                  </a:lnTo>
+                  <a:lnTo>
+                    <a:pt x="10186991" y="1144019"/>
+                  </a:lnTo>
+                  <a:lnTo>
+                    <a:pt x="109534" y="1144019"/>
+                  </a:lnTo>
+                  <a:cubicBezTo>
+                    <a:pt x="49040" y="1144019"/>
+                    <a:pt x="0" y="1094979"/>
+                    <a:pt x="0" y="1034485"/>
+                  </a:cubicBezTo>
+                  <a:lnTo>
+                    <a:pt x="0" y="424878"/>
+                  </a:lnTo>
+                  <a:cubicBezTo>
+                    <a:pt x="0" y="364384"/>
+                    <a:pt x="49040" y="315344"/>
+                    <a:pt x="109534" y="315344"/>
+                  </a:cubicBezTo>
+                  <a:lnTo>
+                    <a:pt x="9905922" y="315344"/>
+                  </a:lnTo>
+                  <a:close/>
+                </a:path>
+              </a:pathLst>
+            </a:custGeom>
+            <a:solidFill>
+              <a:srgbClr val="F15A21"/>
+            </a:solidFill>
+            <a:ln w="38100">
+              <a:solidFill>
+                <a:schemeClr val="tx1">
+                  <a:lumMod val="95000"/>
+                  <a:lumOff val="5000"/>
+                </a:schemeClr>
+              </a:solidFill>
+            </a:ln>
+          </p:spPr>
+          <p:style>
+            <a:lnRef idx="2">
+              <a:schemeClr val="accent1">
+                <a:shade val="50000"/>
+              </a:schemeClr>
+            </a:lnRef>
+            <a:fillRef idx="1">
+              <a:schemeClr val="accent1"/>
+            </a:fillRef>
+            <a:effectRef idx="0">
+              <a:schemeClr val="accent1"/>
+            </a:effectRef>
+            <a:fontRef idx="minor">
+              <a:schemeClr val="lt1"/>
+            </a:fontRef>
+          </p:style>
+          <p:txBody>
+            <a:bodyPr wrap="square" rtlCol="0" anchor="ctr">
+              <a:noAutofit/>
+            </a:bodyPr>
+            <a:lstStyle/>
+            <a:p>
+              <a:pPr algn="ctr">
+                <a:defRPr/>
+              </a:pPr>
+              <a:endParaRPr lang="ko-KR" altLang="en-US">
+                <a:solidFill>
+                  <a:prstClr val="white"/>
+                </a:solidFill>
+              </a:endParaRPr>
+            </a:p>
+          </p:txBody>
+        </p:sp>
+        <p:sp>
+          <p:nvSpPr>
+            <p:cNvPr id="19" name="자유형: 도형 18">
+              <a:extLst>
+                <a:ext uri="{FF2B5EF4-FFF2-40B4-BE49-F238E27FC236}">
+                  <a16:creationId xmlns:a16="http://schemas.microsoft.com/office/drawing/2014/main" id="{3BF90A0B-806C-6199-5647-CB982CB169D5}"/>
+                </a:ext>
+              </a:extLst>
+            </p:cNvPr>
+            <p:cNvSpPr/>
+            <p:nvPr/>
+          </p:nvSpPr>
+          <p:spPr>
+            <a:xfrm>
+              <a:off x="598259" y="0"/>
+              <a:ext cx="11097462" cy="1029718"/>
+            </a:xfrm>
+            <a:custGeom>
+              <a:avLst/>
+              <a:gdLst>
+                <a:gd name="connsiteX0" fmla="*/ 10087183 w 11097462"/>
+                <a:gd name="connsiteY0" fmla="*/ 0 h 1029718"/>
+                <a:gd name="connsiteX1" fmla="*/ 11097462 w 11097462"/>
+                <a:gd name="connsiteY1" fmla="*/ 0 h 1029718"/>
+                <a:gd name="connsiteX2" fmla="*/ 10095285 w 11097462"/>
+                <a:gd name="connsiteY2" fmla="*/ 1002177 h 1029718"/>
+                <a:gd name="connsiteX3" fmla="*/ 10038771 w 11097462"/>
+                <a:gd name="connsiteY3" fmla="*/ 1025586 h 1029718"/>
+                <a:gd name="connsiteX4" fmla="*/ 10031425 w 11097462"/>
+                <a:gd name="connsiteY4" fmla="*/ 1024156 h 1029718"/>
+                <a:gd name="connsiteX5" fmla="*/ 10003877 w 11097462"/>
+                <a:gd name="connsiteY5" fmla="*/ 1029718 h 1029718"/>
+                <a:gd name="connsiteX6" fmla="*/ 79924 w 11097462"/>
+                <a:gd name="connsiteY6" fmla="*/ 1029718 h 1029718"/>
+                <a:gd name="connsiteX7" fmla="*/ 0 w 11097462"/>
+                <a:gd name="connsiteY7" fmla="*/ 949794 h 1029718"/>
+                <a:gd name="connsiteX8" fmla="*/ 0 w 11097462"/>
+                <a:gd name="connsiteY8" fmla="*/ 395267 h 1029718"/>
+                <a:gd name="connsiteX9" fmla="*/ 79924 w 11097462"/>
+                <a:gd name="connsiteY9" fmla="*/ 315343 h 1029718"/>
+                <a:gd name="connsiteX10" fmla="*/ 9771840 w 11097462"/>
+                <a:gd name="connsiteY10" fmla="*/ 315343 h 1029718"/>
+              </a:gdLst>
+              <a:ahLst/>
+              <a:cxnLst>
+                <a:cxn ang="0">
+                  <a:pos x="connsiteX0" y="connsiteY0"/>
+                </a:cxn>
+                <a:cxn ang="0">
+                  <a:pos x="connsiteX1" y="connsiteY1"/>
+                </a:cxn>
+                <a:cxn ang="0">
+                  <a:pos x="connsiteX2" y="connsiteY2"/>
+                </a:cxn>
+                <a:cxn ang="0">
+                  <a:pos x="connsiteX3" y="connsiteY3"/>
+                </a:cxn>
+                <a:cxn ang="0">
+                  <a:pos x="connsiteX4" y="connsiteY4"/>
+                </a:cxn>
+                <a:cxn ang="0">
+                  <a:pos x="connsiteX5" y="connsiteY5"/>
+                </a:cxn>
+                <a:cxn ang="0">
+                  <a:pos x="connsiteX6" y="connsiteY6"/>
+                </a:cxn>
+                <a:cxn ang="0">
+                  <a:pos x="connsiteX7" y="connsiteY7"/>
+                </a:cxn>
+                <a:cxn ang="0">
+                  <a:pos x="connsiteX8" y="connsiteY8"/>
+                </a:cxn>
+                <a:cxn ang="0">
+                  <a:pos x="connsiteX9" y="connsiteY9"/>
+                </a:cxn>
+                <a:cxn ang="0">
+                  <a:pos x="connsiteX10" y="connsiteY10"/>
+                </a:cxn>
+              </a:cxnLst>
+              <a:rect l="l" t="t" r="r" b="b"/>
+              <a:pathLst>
+                <a:path w="11097462" h="1029718">
+                  <a:moveTo>
+                    <a:pt x="10087183" y="0"/>
+                  </a:moveTo>
+                  <a:lnTo>
+                    <a:pt x="11097462" y="0"/>
+                  </a:lnTo>
+                  <a:lnTo>
+                    <a:pt x="10095285" y="1002177"/>
+                  </a:lnTo>
+                  <a:cubicBezTo>
+                    <a:pt x="10079679" y="1017783"/>
+                    <a:pt x="10059225" y="1025586"/>
+                    <a:pt x="10038771" y="1025586"/>
+                  </a:cubicBezTo>
+                  <a:lnTo>
+                    <a:pt x="10031425" y="1024156"/>
+                  </a:lnTo>
+                  <a:lnTo>
+                    <a:pt x="10003877" y="1029718"/>
+                  </a:lnTo>
+                  <a:lnTo>
+                    <a:pt x="79924" y="1029718"/>
+                  </a:lnTo>
+                  <a:cubicBezTo>
+                    <a:pt x="35783" y="1029718"/>
+                    <a:pt x="0" y="993935"/>
+                    <a:pt x="0" y="949794"/>
+                  </a:cubicBezTo>
+                  <a:lnTo>
+                    <a:pt x="0" y="395267"/>
+                  </a:lnTo>
+                  <a:cubicBezTo>
+                    <a:pt x="0" y="351126"/>
+                    <a:pt x="35783" y="315343"/>
+                    <a:pt x="79924" y="315343"/>
+                  </a:cubicBezTo>
+                  <a:lnTo>
+                    <a:pt x="9771840" y="315343"/>
+                  </a:lnTo>
+                  <a:close/>
+                </a:path>
+              </a:pathLst>
+            </a:custGeom>
+            <a:solidFill>
+              <a:schemeClr val="bg1"/>
+            </a:solidFill>
+            <a:ln w="38100">
+              <a:solidFill>
+                <a:schemeClr val="tx1">
+                  <a:lumMod val="95000"/>
+                  <a:lumOff val="5000"/>
+                </a:schemeClr>
+              </a:solidFill>
+            </a:ln>
+            <a:effectLst/>
+          </p:spPr>
+          <p:style>
+            <a:lnRef idx="2">
+              <a:schemeClr val="accent1">
+                <a:shade val="50000"/>
+              </a:schemeClr>
+            </a:lnRef>
+            <a:fillRef idx="1">
+              <a:schemeClr val="accent1"/>
+            </a:fillRef>
+            <a:effectRef idx="0">
+              <a:schemeClr val="accent1"/>
+            </a:effectRef>
+            <a:fontRef idx="minor">
+              <a:schemeClr val="lt1"/>
+            </a:fontRef>
+          </p:style>
+          <p:txBody>
+            <a:bodyPr wrap="square" rtlCol="0" anchor="ctr">
+              <a:noAutofit/>
+            </a:bodyPr>
+            <a:lstStyle/>
+            <a:p>
+              <a:pPr algn="ctr">
+                <a:defRPr/>
+              </a:pPr>
+              <a:endParaRPr lang="ko-KR" altLang="en-US">
+                <a:solidFill>
+                  <a:prstClr val="white"/>
+                </a:solidFill>
+              </a:endParaRPr>
+            </a:p>
+          </p:txBody>
+        </p:sp>
+        <p:sp>
+          <p:nvSpPr>
+            <p:cNvPr id="5" name="자유형: 도형 4">
+              <a:extLst>
+                <a:ext uri="{FF2B5EF4-FFF2-40B4-BE49-F238E27FC236}">
+                  <a16:creationId xmlns:a16="http://schemas.microsoft.com/office/drawing/2014/main" id="{BA5A35FA-D56B-6958-CCCF-E9A4F202E6F9}"/>
+                </a:ext>
+              </a:extLst>
+            </p:cNvPr>
+            <p:cNvSpPr/>
+            <p:nvPr/>
+          </p:nvSpPr>
+          <p:spPr>
+            <a:xfrm>
+              <a:off x="579119" y="-31785"/>
+              <a:ext cx="11116597" cy="1029718"/>
+            </a:xfrm>
+            <a:custGeom>
+              <a:avLst/>
+              <a:gdLst>
+                <a:gd name="connsiteX0" fmla="*/ 9632199 w 11116597"/>
+                <a:gd name="connsiteY0" fmla="*/ 0 h 1029718"/>
+                <a:gd name="connsiteX1" fmla="*/ 11116597 w 11116597"/>
+                <a:gd name="connsiteY1" fmla="*/ 0 h 1029718"/>
+                <a:gd name="connsiteX2" fmla="*/ 10372629 w 11116597"/>
+                <a:gd name="connsiteY2" fmla="*/ 743968 h 1029718"/>
+                <a:gd name="connsiteX3" fmla="*/ 10075587 w 11116597"/>
+                <a:gd name="connsiteY3" fmla="*/ 1029718 h 1029718"/>
+                <a:gd name="connsiteX4" fmla="*/ 10081608 w 11116597"/>
+                <a:gd name="connsiteY4" fmla="*/ 688673 h 1029718"/>
+                <a:gd name="connsiteX5" fmla="*/ 10083080 w 11116597"/>
+                <a:gd name="connsiteY5" fmla="*/ 540467 h 1029718"/>
+                <a:gd name="connsiteX6" fmla="*/ 10079100 w 11116597"/>
+                <a:gd name="connsiteY6" fmla="*/ 550075 h 1029718"/>
+                <a:gd name="connsiteX7" fmla="*/ 10065617 w 11116597"/>
+                <a:gd name="connsiteY7" fmla="*/ 555660 h 1029718"/>
+                <a:gd name="connsiteX8" fmla="*/ 19068 w 11116597"/>
+                <a:gd name="connsiteY8" fmla="*/ 555660 h 1029718"/>
+                <a:gd name="connsiteX9" fmla="*/ 0 w 11116597"/>
+                <a:gd name="connsiteY9" fmla="*/ 536592 h 1029718"/>
+                <a:gd name="connsiteX10" fmla="*/ 0 w 11116597"/>
+                <a:gd name="connsiteY10" fmla="*/ 404296 h 1029718"/>
+                <a:gd name="connsiteX11" fmla="*/ 19068 w 11116597"/>
+                <a:gd name="connsiteY11" fmla="*/ 385228 h 1029718"/>
+                <a:gd name="connsiteX12" fmla="*/ 10065617 w 11116597"/>
+                <a:gd name="connsiteY12" fmla="*/ 385228 h 1029718"/>
+                <a:gd name="connsiteX13" fmla="*/ 10084685 w 11116597"/>
+                <a:gd name="connsiteY13" fmla="*/ 404296 h 1029718"/>
+                <a:gd name="connsiteX14" fmla="*/ 10084685 w 11116597"/>
+                <a:gd name="connsiteY14" fmla="*/ 445614 h 1029718"/>
+                <a:gd name="connsiteX15" fmla="*/ 10087630 w 11116597"/>
+                <a:gd name="connsiteY15" fmla="*/ 315480 h 1029718"/>
+                <a:gd name="connsiteX16" fmla="*/ 9630430 w 11116597"/>
+                <a:gd name="connsiteY16" fmla="*/ 1769 h 1029718"/>
+              </a:gdLst>
+              <a:ahLst/>
+              <a:cxnLst>
+                <a:cxn ang="0">
+                  <a:pos x="connsiteX0" y="connsiteY0"/>
+                </a:cxn>
+                <a:cxn ang="0">
+                  <a:pos x="connsiteX1" y="connsiteY1"/>
+                </a:cxn>
+                <a:cxn ang="0">
+                  <a:pos x="connsiteX2" y="connsiteY2"/>
+                </a:cxn>
+                <a:cxn ang="0">
+                  <a:pos x="connsiteX3" y="connsiteY3"/>
+                </a:cxn>
+                <a:cxn ang="0">
+                  <a:pos x="connsiteX4" y="connsiteY4"/>
+                </a:cxn>
+                <a:cxn ang="0">
+                  <a:pos x="connsiteX5" y="connsiteY5"/>
+                </a:cxn>
+                <a:cxn ang="0">
+                  <a:pos x="connsiteX6" y="connsiteY6"/>
+                </a:cxn>
+                <a:cxn ang="0">
+                  <a:pos x="connsiteX7" y="connsiteY7"/>
+                </a:cxn>
+                <a:cxn ang="0">
+                  <a:pos x="connsiteX8" y="connsiteY8"/>
+                </a:cxn>
+                <a:cxn ang="0">
+                  <a:pos x="connsiteX9" y="connsiteY9"/>
+                </a:cxn>
+                <a:cxn ang="0">
+                  <a:pos x="connsiteX10" y="connsiteY10"/>
+                </a:cxn>
+                <a:cxn ang="0">
+                  <a:pos x="connsiteX11" y="connsiteY11"/>
+                </a:cxn>
+                <a:cxn ang="0">
+                  <a:pos x="connsiteX12" y="connsiteY12"/>
+                </a:cxn>
+                <a:cxn ang="0">
+                  <a:pos x="connsiteX13" y="connsiteY13"/>
+                </a:cxn>
+                <a:cxn ang="0">
+                  <a:pos x="connsiteX14" y="connsiteY14"/>
+                </a:cxn>
+                <a:cxn ang="0">
+                  <a:pos x="connsiteX15" y="connsiteY15"/>
+                </a:cxn>
+                <a:cxn ang="0">
+                  <a:pos x="connsiteX16" y="connsiteY16"/>
+                </a:cxn>
+              </a:cxnLst>
+              <a:rect l="l" t="t" r="r" b="b"/>
+              <a:pathLst>
+                <a:path w="11116597" h="1029718">
+                  <a:moveTo>
+                    <a:pt x="9632199" y="0"/>
+                  </a:moveTo>
+                  <a:lnTo>
+                    <a:pt x="11116597" y="0"/>
+                  </a:lnTo>
+                  <a:lnTo>
+                    <a:pt x="10372629" y="743968"/>
+                  </a:lnTo>
+                  <a:cubicBezTo>
+                    <a:pt x="10326769" y="789828"/>
+                    <a:pt x="10130971" y="1011283"/>
+                    <a:pt x="10075587" y="1029718"/>
+                  </a:cubicBezTo>
+                  <a:cubicBezTo>
+                    <a:pt x="10079578" y="936078"/>
+                    <a:pt x="10080593" y="815054"/>
+                    <a:pt x="10081608" y="688673"/>
+                  </a:cubicBezTo>
+                  <a:lnTo>
+                    <a:pt x="10083080" y="540467"/>
+                  </a:lnTo>
+                  <a:lnTo>
+                    <a:pt x="10079100" y="550075"/>
+                  </a:lnTo>
+                  <a:cubicBezTo>
+                    <a:pt x="10075650" y="553526"/>
+                    <a:pt x="10070883" y="555660"/>
+                    <a:pt x="10065617" y="555660"/>
+                  </a:cubicBezTo>
+                  <a:lnTo>
+                    <a:pt x="19068" y="555660"/>
+                  </a:lnTo>
+                  <a:cubicBezTo>
+                    <a:pt x="8537" y="555660"/>
+                    <a:pt x="0" y="547123"/>
+                    <a:pt x="0" y="536592"/>
+                  </a:cubicBezTo>
+                  <a:lnTo>
+                    <a:pt x="0" y="404296"/>
+                  </a:lnTo>
+                  <a:cubicBezTo>
+                    <a:pt x="0" y="393765"/>
+                    <a:pt x="8537" y="385228"/>
+                    <a:pt x="19068" y="385228"/>
+                  </a:cubicBezTo>
+                  <a:lnTo>
+                    <a:pt x="10065617" y="385228"/>
+                  </a:lnTo>
+                  <a:cubicBezTo>
+                    <a:pt x="10076148" y="385228"/>
+                    <a:pt x="10084685" y="393765"/>
+                    <a:pt x="10084685" y="404296"/>
+                  </a:cubicBezTo>
+                  <a:lnTo>
+                    <a:pt x="10084685" y="445614"/>
+                  </a:lnTo>
+                  <a:lnTo>
+                    <a:pt x="10087630" y="315480"/>
+                  </a:lnTo>
+                  <a:cubicBezTo>
+                    <a:pt x="10041770" y="269620"/>
+                    <a:pt x="9584570" y="47629"/>
+                    <a:pt x="9630430" y="1769"/>
+                  </a:cubicBezTo>
+                  <a:close/>
+                </a:path>
+              </a:pathLst>
+            </a:custGeom>
+            <a:solidFill>
+              <a:schemeClr val="accent1">
+                <a:alpha val="25000"/>
+              </a:schemeClr>
+            </a:solidFill>
+            <a:ln w="38100">
+              <a:noFill/>
+            </a:ln>
+            <a:effectLst/>
+          </p:spPr>
+          <p:style>
+            <a:lnRef idx="2">
+              <a:schemeClr val="accent1">
+                <a:shade val="50000"/>
+              </a:schemeClr>
+            </a:lnRef>
+            <a:fillRef idx="1">
+              <a:schemeClr val="accent1"/>
+            </a:fillRef>
+            <a:effectRef idx="0">
+              <a:schemeClr val="accent1"/>
+            </a:effectRef>
+            <a:fontRef idx="minor">
+              <a:schemeClr val="lt1"/>
+            </a:fontRef>
+          </p:style>
+          <p:txBody>
+            <a:bodyPr wrap="square" rtlCol="0" anchor="ctr">
+              <a:noAutofit/>
+            </a:bodyPr>
+            <a:lstStyle/>
+            <a:p>
+              <a:pPr algn="ctr">
+                <a:defRPr/>
+              </a:pPr>
+              <a:endParaRPr lang="ko-KR" altLang="en-US">
+                <a:solidFill>
+                  <a:prstClr val="white"/>
+                </a:solidFill>
+              </a:endParaRPr>
+            </a:p>
+          </p:txBody>
+        </p:sp>
+        <p:sp>
+          <p:nvSpPr>
+            <p:cNvPr id="8" name="평행 사변형 7">
+              <a:extLst>
+                <a:ext uri="{FF2B5EF4-FFF2-40B4-BE49-F238E27FC236}">
+                  <a16:creationId xmlns:a16="http://schemas.microsoft.com/office/drawing/2014/main" id="{B9003670-0CB9-C3D9-CB6A-C0CB3E07759C}"/>
+                </a:ext>
+              </a:extLst>
+            </p:cNvPr>
+            <p:cNvSpPr/>
+            <p:nvPr/>
+          </p:nvSpPr>
+          <p:spPr>
+            <a:xfrm>
+              <a:off x="462722" y="0"/>
+              <a:ext cx="10557703" cy="353443"/>
+            </a:xfrm>
+            <a:prstGeom prst="parallelogram">
+              <a:avLst>
+                <a:gd name="adj" fmla="val 99713"/>
+              </a:avLst>
+            </a:prstGeom>
+            <a:solidFill>
+              <a:srgbClr val="F15A21"/>
+            </a:solidFill>
+            <a:ln w="38100">
+              <a:solidFill>
+                <a:schemeClr val="tx1">
+                  <a:lumMod val="95000"/>
+                  <a:lumOff val="5000"/>
+                </a:schemeClr>
+              </a:solidFill>
+              <a:round/>
+            </a:ln>
+          </p:spPr>
+          <p:style>
+            <a:lnRef idx="2">
+              <a:schemeClr val="accent1">
+                <a:shade val="50000"/>
+              </a:schemeClr>
+            </a:lnRef>
+            <a:fillRef idx="1">
+              <a:schemeClr val="accent1"/>
+            </a:fillRef>
+            <a:effectRef idx="0">
+              <a:schemeClr val="accent1"/>
+            </a:effectRef>
+            <a:fontRef idx="minor">
+              <a:schemeClr val="lt1"/>
+            </a:fontRef>
+          </p:style>
+          <p:txBody>
+            <a:bodyPr rtlCol="0" anchor="ctr"/>
+            <a:lstStyle/>
+            <a:p>
+              <a:pPr algn="ctr">
+                <a:defRPr/>
+              </a:pPr>
+              <a:endParaRPr lang="ko-KR" altLang="en-US">
+                <a:solidFill>
+                  <a:prstClr val="white"/>
+                </a:solidFill>
+              </a:endParaRPr>
+            </a:p>
+          </p:txBody>
+        </p:sp>
+        <p:cxnSp>
+          <p:nvCxnSpPr>
+            <p:cNvPr id="6" name="직선 연결선 5">
+              <a:extLst>
+                <a:ext uri="{FF2B5EF4-FFF2-40B4-BE49-F238E27FC236}">
+                  <a16:creationId xmlns:a16="http://schemas.microsoft.com/office/drawing/2014/main" id="{9AC97124-06C1-C03C-3E30-298E524D227E}"/>
+                </a:ext>
+              </a:extLst>
+            </p:cNvPr>
+            <p:cNvCxnSpPr>
+              <a:cxnSpLocks/>
+            </p:cNvCxnSpPr>
+            <p:nvPr/>
+          </p:nvCxnSpPr>
+          <p:spPr>
+            <a:xfrm rot="18900000">
+              <a:off x="10864508" y="226747"/>
+              <a:ext cx="612000" cy="0"/>
+            </a:xfrm>
+            <a:prstGeom prst="line">
+              <a:avLst/>
+            </a:prstGeom>
+            <a:ln>
+              <a:solidFill>
+                <a:schemeClr val="tx1">
+                  <a:lumMod val="95000"/>
+                  <a:lumOff val="5000"/>
+                </a:schemeClr>
+              </a:solidFill>
+            </a:ln>
+          </p:spPr>
+          <p:style>
+            <a:lnRef idx="1">
+              <a:schemeClr val="accent1"/>
+            </a:lnRef>
+            <a:fillRef idx="0">
+              <a:schemeClr val="accent1"/>
+            </a:fillRef>
+            <a:effectRef idx="0">
+              <a:schemeClr val="accent1"/>
+            </a:effectRef>
+            <a:fontRef idx="minor">
+              <a:schemeClr val="tx1"/>
+            </a:fontRef>
+          </p:style>
+        </p:cxnSp>
+        <p:cxnSp>
+          <p:nvCxnSpPr>
+            <p:cNvPr id="12" name="직선 연결선 11">
+              <a:extLst>
+                <a:ext uri="{FF2B5EF4-FFF2-40B4-BE49-F238E27FC236}">
+                  <a16:creationId xmlns:a16="http://schemas.microsoft.com/office/drawing/2014/main" id="{4EBADE62-4253-8AC7-1EEA-2264355B18A1}"/>
+                </a:ext>
+              </a:extLst>
+            </p:cNvPr>
+            <p:cNvCxnSpPr>
+              <a:cxnSpLocks/>
+            </p:cNvCxnSpPr>
+            <p:nvPr/>
+          </p:nvCxnSpPr>
+          <p:spPr>
+            <a:xfrm rot="18900000">
+              <a:off x="10633731" y="457887"/>
+              <a:ext cx="720000" cy="0"/>
+            </a:xfrm>
+            <a:prstGeom prst="line">
+              <a:avLst/>
+            </a:prstGeom>
+            <a:ln>
+              <a:solidFill>
+                <a:schemeClr val="tx1">
+                  <a:lumMod val="95000"/>
+                  <a:lumOff val="5000"/>
+                </a:schemeClr>
+              </a:solidFill>
+            </a:ln>
+          </p:spPr>
+          <p:style>
+            <a:lnRef idx="1">
+              <a:schemeClr val="accent1"/>
+            </a:lnRef>
+            <a:fillRef idx="0">
+              <a:schemeClr val="accent1"/>
+            </a:fillRef>
+            <a:effectRef idx="0">
+              <a:schemeClr val="accent1"/>
+            </a:effectRef>
+            <a:fontRef idx="minor">
+              <a:schemeClr val="tx1"/>
+            </a:fontRef>
+          </p:style>
+        </p:cxnSp>
+        <p:cxnSp>
+          <p:nvCxnSpPr>
+            <p:cNvPr id="13" name="직선 연결선 12">
+              <a:extLst>
+                <a:ext uri="{FF2B5EF4-FFF2-40B4-BE49-F238E27FC236}">
+                  <a16:creationId xmlns:a16="http://schemas.microsoft.com/office/drawing/2014/main" id="{E57EAF6C-E978-CB93-B94E-DE2B29DDB589}"/>
+                </a:ext>
+              </a:extLst>
+            </p:cNvPr>
+            <p:cNvCxnSpPr>
+              <a:cxnSpLocks/>
+            </p:cNvCxnSpPr>
+            <p:nvPr/>
+          </p:nvCxnSpPr>
+          <p:spPr>
+            <a:xfrm rot="18900000">
+              <a:off x="10856160" y="354506"/>
+              <a:ext cx="576000" cy="0"/>
+            </a:xfrm>
+            <a:prstGeom prst="line">
+              <a:avLst/>
+            </a:prstGeom>
+            <a:ln>
+              <a:solidFill>
+                <a:schemeClr val="tx1">
+                  <a:lumMod val="95000"/>
+                  <a:lumOff val="5000"/>
+                </a:schemeClr>
+              </a:solidFill>
+            </a:ln>
+          </p:spPr>
+          <p:style>
+            <a:lnRef idx="1">
+              <a:schemeClr val="accent1"/>
+            </a:lnRef>
+            <a:fillRef idx="0">
+              <a:schemeClr val="accent1"/>
+            </a:fillRef>
+            <a:effectRef idx="0">
+              <a:schemeClr val="accent1"/>
+            </a:effectRef>
+            <a:fontRef idx="minor">
+              <a:schemeClr val="tx1"/>
+            </a:fontRef>
+          </p:style>
+        </p:cxnSp>
+        <p:cxnSp>
+          <p:nvCxnSpPr>
+            <p:cNvPr id="14" name="직선 연결선 13">
+              <a:extLst>
+                <a:ext uri="{FF2B5EF4-FFF2-40B4-BE49-F238E27FC236}">
+                  <a16:creationId xmlns:a16="http://schemas.microsoft.com/office/drawing/2014/main" id="{62ACB5FA-26EA-343B-9E6F-B7AC9EDBDBBA}"/>
+                </a:ext>
+              </a:extLst>
+            </p:cNvPr>
+            <p:cNvCxnSpPr>
+              <a:cxnSpLocks/>
+            </p:cNvCxnSpPr>
+            <p:nvPr/>
+          </p:nvCxnSpPr>
+          <p:spPr>
+            <a:xfrm>
+              <a:off x="892691" y="710128"/>
+              <a:ext cx="720000" cy="0"/>
+            </a:xfrm>
+            <a:prstGeom prst="line">
+              <a:avLst/>
+            </a:prstGeom>
+            <a:ln w="41275" cap="rnd">
+              <a:solidFill>
+                <a:schemeClr val="tx1">
+                  <a:lumMod val="95000"/>
+                  <a:lumOff val="5000"/>
+                </a:schemeClr>
+              </a:solidFill>
+            </a:ln>
+          </p:spPr>
+          <p:style>
+            <a:lnRef idx="1">
+              <a:schemeClr val="accent1"/>
+            </a:lnRef>
+            <a:fillRef idx="0">
+              <a:schemeClr val="accent1"/>
+            </a:fillRef>
+            <a:effectRef idx="0">
+              <a:schemeClr val="accent1"/>
+            </a:effectRef>
+            <a:fontRef idx="minor">
+              <a:schemeClr val="tx1"/>
+            </a:fontRef>
+          </p:style>
+        </p:cxnSp>
+        <p:sp>
+          <p:nvSpPr>
+            <p:cNvPr id="23" name="자유형: 도형 22">
+              <a:extLst>
+                <a:ext uri="{FF2B5EF4-FFF2-40B4-BE49-F238E27FC236}">
+                  <a16:creationId xmlns:a16="http://schemas.microsoft.com/office/drawing/2014/main" id="{E3133A7D-9557-EE3E-686B-2EDEF46AD416}"/>
+                </a:ext>
+              </a:extLst>
+            </p:cNvPr>
+            <p:cNvSpPr/>
+            <p:nvPr/>
+          </p:nvSpPr>
+          <p:spPr>
+            <a:xfrm>
+              <a:off x="1034246" y="716835"/>
+              <a:ext cx="436890" cy="679927"/>
+            </a:xfrm>
+            <a:custGeom>
+              <a:avLst/>
+              <a:gdLst>
+                <a:gd name="connsiteX0" fmla="*/ 144463 w 436890"/>
+                <a:gd name="connsiteY0" fmla="*/ 0 h 679927"/>
+                <a:gd name="connsiteX1" fmla="*/ 436890 w 436890"/>
+                <a:gd name="connsiteY1" fmla="*/ 0 h 679927"/>
+                <a:gd name="connsiteX2" fmla="*/ 401338 w 436890"/>
+                <a:gd name="connsiteY2" fmla="*/ 7178 h 679927"/>
+                <a:gd name="connsiteX3" fmla="*/ 308545 w 436890"/>
+                <a:gd name="connsiteY3" fmla="*/ 147170 h 679927"/>
+                <a:gd name="connsiteX4" fmla="*/ 308545 w 436890"/>
+                <a:gd name="connsiteY4" fmla="*/ 366713 h 679927"/>
+                <a:gd name="connsiteX5" fmla="*/ 308545 w 436890"/>
+                <a:gd name="connsiteY5" fmla="*/ 462723 h 679927"/>
+                <a:gd name="connsiteX6" fmla="*/ 308545 w 436890"/>
+                <a:gd name="connsiteY6" fmla="*/ 498036 h 679927"/>
+                <a:gd name="connsiteX7" fmla="*/ 308545 w 436890"/>
+                <a:gd name="connsiteY7" fmla="*/ 679927 h 679927"/>
+                <a:gd name="connsiteX8" fmla="*/ 154273 w 436890"/>
+                <a:gd name="connsiteY8" fmla="*/ 582806 h 679927"/>
+                <a:gd name="connsiteX9" fmla="*/ 0 w 436890"/>
+                <a:gd name="connsiteY9" fmla="*/ 679927 h 679927"/>
+                <a:gd name="connsiteX10" fmla="*/ 0 w 436890"/>
+                <a:gd name="connsiteY10" fmla="*/ 498036 h 679927"/>
+                <a:gd name="connsiteX11" fmla="*/ 0 w 436890"/>
+                <a:gd name="connsiteY11" fmla="*/ 462723 h 679927"/>
+                <a:gd name="connsiteX12" fmla="*/ 0 w 436890"/>
+                <a:gd name="connsiteY12" fmla="*/ 366713 h 679927"/>
+                <a:gd name="connsiteX13" fmla="*/ 0 w 436890"/>
+                <a:gd name="connsiteY13" fmla="*/ 144463 h 679927"/>
+                <a:gd name="connsiteX14" fmla="*/ 0 w 436890"/>
+                <a:gd name="connsiteY14" fmla="*/ 131323 h 679927"/>
+                <a:gd name="connsiteX15" fmla="*/ 2653 w 436890"/>
+                <a:gd name="connsiteY15" fmla="*/ 131323 h 679927"/>
+                <a:gd name="connsiteX16" fmla="*/ 11353 w 436890"/>
+                <a:gd name="connsiteY16" fmla="*/ 88232 h 679927"/>
+                <a:gd name="connsiteX17" fmla="*/ 144463 w 436890"/>
+                <a:gd name="connsiteY17" fmla="*/ 0 h 679927"/>
+              </a:gdLst>
+              <a:ahLst/>
+              <a:cxnLst>
+                <a:cxn ang="0">
+                  <a:pos x="connsiteX0" y="connsiteY0"/>
+                </a:cxn>
+                <a:cxn ang="0">
+                  <a:pos x="connsiteX1" y="connsiteY1"/>
+                </a:cxn>
+                <a:cxn ang="0">
+                  <a:pos x="connsiteX2" y="connsiteY2"/>
+                </a:cxn>
+                <a:cxn ang="0">
+                  <a:pos x="connsiteX3" y="connsiteY3"/>
+                </a:cxn>
+                <a:cxn ang="0">
+                  <a:pos x="connsiteX4" y="connsiteY4"/>
+                </a:cxn>
+                <a:cxn ang="0">
+                  <a:pos x="connsiteX5" y="connsiteY5"/>
+                </a:cxn>
+                <a:cxn ang="0">
+                  <a:pos x="connsiteX6" y="connsiteY6"/>
+                </a:cxn>
+                <a:cxn ang="0">
+                  <a:pos x="connsiteX7" y="connsiteY7"/>
+                </a:cxn>
+                <a:cxn ang="0">
+                  <a:pos x="connsiteX8" y="connsiteY8"/>
+                </a:cxn>
+                <a:cxn ang="0">
+                  <a:pos x="connsiteX9" y="connsiteY9"/>
+                </a:cxn>
+                <a:cxn ang="0">
+                  <a:pos x="connsiteX10" y="connsiteY10"/>
+                </a:cxn>
+                <a:cxn ang="0">
+                  <a:pos x="connsiteX11" y="connsiteY11"/>
+                </a:cxn>
+                <a:cxn ang="0">
+                  <a:pos x="connsiteX12" y="connsiteY12"/>
+                </a:cxn>
+                <a:cxn ang="0">
+                  <a:pos x="connsiteX13" y="connsiteY13"/>
+                </a:cxn>
+                <a:cxn ang="0">
+                  <a:pos x="connsiteX14" y="connsiteY14"/>
+                </a:cxn>
+                <a:cxn ang="0">
+                  <a:pos x="connsiteX15" y="connsiteY15"/>
+                </a:cxn>
+                <a:cxn ang="0">
+                  <a:pos x="connsiteX16" y="connsiteY16"/>
+                </a:cxn>
+                <a:cxn ang="0">
+                  <a:pos x="connsiteX17" y="connsiteY17"/>
+                </a:cxn>
+              </a:cxnLst>
+              <a:rect l="l" t="t" r="r" b="b"/>
+              <a:pathLst>
+                <a:path w="436890" h="679927">
+                  <a:moveTo>
+                    <a:pt x="144463" y="0"/>
+                  </a:moveTo>
+                  <a:lnTo>
+                    <a:pt x="436890" y="0"/>
+                  </a:lnTo>
+                  <a:lnTo>
+                    <a:pt x="401338" y="7178"/>
+                  </a:lnTo>
+                  <a:cubicBezTo>
+                    <a:pt x="346808" y="30242"/>
+                    <a:pt x="308545" y="84238"/>
+                    <a:pt x="308545" y="147170"/>
+                  </a:cubicBezTo>
+                  <a:lnTo>
+                    <a:pt x="308545" y="366713"/>
+                  </a:lnTo>
+                  <a:lnTo>
+                    <a:pt x="308545" y="462723"/>
+                  </a:lnTo>
+                  <a:lnTo>
+                    <a:pt x="308545" y="498036"/>
+                  </a:lnTo>
+                  <a:lnTo>
+                    <a:pt x="308545" y="679927"/>
+                  </a:lnTo>
+                  <a:lnTo>
+                    <a:pt x="154273" y="582806"/>
+                  </a:lnTo>
+                  <a:lnTo>
+                    <a:pt x="0" y="679927"/>
+                  </a:lnTo>
+                  <a:lnTo>
+                    <a:pt x="0" y="498036"/>
+                  </a:lnTo>
+                  <a:lnTo>
+                    <a:pt x="0" y="462723"/>
+                  </a:lnTo>
+                  <a:lnTo>
+                    <a:pt x="0" y="366713"/>
+                  </a:lnTo>
+                  <a:lnTo>
+                    <a:pt x="0" y="144463"/>
+                  </a:lnTo>
+                  <a:lnTo>
+                    <a:pt x="0" y="131323"/>
+                  </a:lnTo>
+                  <a:lnTo>
+                    <a:pt x="2653" y="131323"/>
+                  </a:lnTo>
+                  <a:lnTo>
+                    <a:pt x="11353" y="88232"/>
+                  </a:lnTo>
+                  <a:cubicBezTo>
+                    <a:pt x="33283" y="36382"/>
+                    <a:pt x="84625" y="0"/>
+                    <a:pt x="144463" y="0"/>
+                  </a:cubicBezTo>
+                  <a:close/>
+                </a:path>
+              </a:pathLst>
+            </a:custGeom>
+            <a:solidFill>
+              <a:srgbClr val="00B0F0"/>
+            </a:solidFill>
+            <a:ln w="38100">
+              <a:solidFill>
+                <a:schemeClr val="tx1">
+                  <a:lumMod val="95000"/>
+                  <a:lumOff val="5000"/>
+                </a:schemeClr>
+              </a:solidFill>
+            </a:ln>
+          </p:spPr>
+          <p:style>
+            <a:lnRef idx="2">
+              <a:schemeClr val="accent1">
+                <a:shade val="50000"/>
+              </a:schemeClr>
+            </a:lnRef>
+            <a:fillRef idx="1">
+              <a:schemeClr val="accent1"/>
+            </a:fillRef>
+            <a:effectRef idx="0">
+              <a:schemeClr val="accent1"/>
+            </a:effectRef>
+            <a:fontRef idx="minor">
+              <a:schemeClr val="lt1"/>
+            </a:fontRef>
+          </p:style>
+          <p:txBody>
+            <a:bodyPr wrap="square" rtlCol="0" anchor="ctr">
+              <a:noAutofit/>
+            </a:bodyPr>
+            <a:lstStyle/>
+            <a:p>
+              <a:pPr algn="ctr">
+                <a:defRPr/>
+              </a:pPr>
+              <a:endParaRPr lang="ko-KR" altLang="en-US">
+                <a:solidFill>
+                  <a:prstClr val="black"/>
+                </a:solidFill>
+              </a:endParaRPr>
+            </a:p>
+          </p:txBody>
+        </p:sp>
+      </p:grpSp>
+      <p:sp>
+        <p:nvSpPr>
+          <p:cNvPr id="25" name="TextBox 24">
+            <a:extLst>
+              <a:ext uri="{FF2B5EF4-FFF2-40B4-BE49-F238E27FC236}">
+                <a16:creationId xmlns:a16="http://schemas.microsoft.com/office/drawing/2014/main" id="{8C182DCE-9ABA-C223-83A9-C0965E0CC853}"/>
+              </a:ext>
+            </a:extLst>
+          </p:cNvPr>
+          <p:cNvSpPr txBox="1"/>
+          <p:nvPr/>
+        </p:nvSpPr>
+        <p:spPr>
+          <a:xfrm>
+            <a:off x="1754746" y="572134"/>
+            <a:ext cx="4659190" cy="400110"/>
+          </a:xfrm>
+          <a:prstGeom prst="rect">
+            <a:avLst/>
+          </a:prstGeom>
+          <a:noFill/>
+        </p:spPr>
+        <p:txBody>
+          <a:bodyPr wrap="square">
+            <a:spAutoFit/>
+          </a:bodyPr>
+          <a:lstStyle/>
+          <a:p>
+            <a:pPr marL="0" lvl="1" indent="-457200">
+              <a:defRPr/>
+            </a:pPr>
+            <a:r>
+              <a:rPr lang="en-US" altLang="ko-KR" sz="2000" b="1" i="1" kern="0" dirty="0">
+                <a:ln w="15875">
+                  <a:noFill/>
+                </a:ln>
+                <a:solidFill>
+                  <a:prstClr val="white">
+                    <a:lumMod val="75000"/>
+                  </a:prstClr>
+                </a:solidFill>
+                <a:latin typeface="Tmon몬소리 Black" panose="02000A03000000000000" pitchFamily="2" charset="-127"/>
+                <a:ea typeface="Tmon몬소리 Black" panose="02000A03000000000000" pitchFamily="2" charset="-127"/>
+              </a:rPr>
+              <a:t>Question 2</a:t>
+            </a:r>
+          </a:p>
+        </p:txBody>
+      </p:sp>
+      <p:pic>
+        <p:nvPicPr>
+          <p:cNvPr id="9" name="Picture 8">
+            <a:extLst>
+              <a:ext uri="{FF2B5EF4-FFF2-40B4-BE49-F238E27FC236}">
+                <a16:creationId xmlns:a16="http://schemas.microsoft.com/office/drawing/2014/main" id="{B525ECE0-3487-7EFA-46DE-71D525FFB168}"/>
+              </a:ext>
+            </a:extLst>
+          </p:cNvPr>
+          <p:cNvPicPr>
+            <a:picLocks noChangeAspect="1"/>
+          </p:cNvPicPr>
+          <p:nvPr/>
+        </p:nvPicPr>
+        <p:blipFill>
+          <a:blip r:embed="rId2"/>
+          <a:stretch>
+            <a:fillRect/>
+          </a:stretch>
+        </p:blipFill>
+        <p:spPr>
+          <a:xfrm>
+            <a:off x="579119" y="1500702"/>
+            <a:ext cx="10766617" cy="4785163"/>
+          </a:xfrm>
+          <a:prstGeom prst="rect">
+            <a:avLst/>
+          </a:prstGeom>
+        </p:spPr>
+      </p:pic>
+      <p:pic>
+        <p:nvPicPr>
+          <p:cNvPr id="10" name="Graphic 9" descr="Baseball with solid fill">
+            <a:extLst>
+              <a:ext uri="{FF2B5EF4-FFF2-40B4-BE49-F238E27FC236}">
+                <a16:creationId xmlns:a16="http://schemas.microsoft.com/office/drawing/2014/main" id="{F1328FC3-D6B6-5759-76C9-CD672338C7CE}"/>
+              </a:ext>
+            </a:extLst>
+          </p:cNvPr>
+          <p:cNvPicPr>
+            <a:picLocks noChangeAspect="1"/>
+          </p:cNvPicPr>
+          <p:nvPr/>
+        </p:nvPicPr>
+        <p:blipFill>
+          <a:blip r:embed="rId3">
+            <a:extLst>
+              <a:ext uri="{28A0092B-C50C-407E-A947-70E740481C1C}">
+                <a14:useLocalDpi xmlns:a14="http://schemas.microsoft.com/office/drawing/2010/main" val="0"/>
+              </a:ext>
+              <a:ext uri="{96DAC541-7B7A-43D3-8B79-37D633B846F1}">
+                <asvg:svgBlip xmlns:asvg="http://schemas.microsoft.com/office/drawing/2016/SVG/main" r:embed="rId4"/>
+              </a:ext>
+            </a:extLst>
+          </a:blip>
+          <a:stretch>
+            <a:fillRect/>
+          </a:stretch>
+        </p:blipFill>
+        <p:spPr>
+          <a:xfrm>
+            <a:off x="-169585" y="1175802"/>
+            <a:ext cx="914400" cy="914400"/>
+          </a:xfrm>
+          <a:prstGeom prst="rect">
+            <a:avLst/>
+          </a:prstGeom>
+        </p:spPr>
+      </p:pic>
+      <p:pic>
+        <p:nvPicPr>
+          <p:cNvPr id="11" name="Graphic 10" descr="Baseball with solid fill">
+            <a:extLst>
+              <a:ext uri="{FF2B5EF4-FFF2-40B4-BE49-F238E27FC236}">
+                <a16:creationId xmlns:a16="http://schemas.microsoft.com/office/drawing/2014/main" id="{CB381231-F2C8-1680-6745-7A746D34CD4C}"/>
+              </a:ext>
+            </a:extLst>
+          </p:cNvPr>
+          <p:cNvPicPr>
+            <a:picLocks noChangeAspect="1"/>
+          </p:cNvPicPr>
+          <p:nvPr/>
+        </p:nvPicPr>
+        <p:blipFill>
+          <a:blip r:embed="rId3">
+            <a:extLst>
+              <a:ext uri="{28A0092B-C50C-407E-A947-70E740481C1C}">
+                <a14:useLocalDpi xmlns:a14="http://schemas.microsoft.com/office/drawing/2010/main" val="0"/>
+              </a:ext>
+              <a:ext uri="{96DAC541-7B7A-43D3-8B79-37D633B846F1}">
+                <asvg:svgBlip xmlns:asvg="http://schemas.microsoft.com/office/drawing/2016/SVG/main" r:embed="rId4"/>
+              </a:ext>
+            </a:extLst>
+          </a:blip>
+          <a:stretch>
+            <a:fillRect/>
+          </a:stretch>
+        </p:blipFill>
+        <p:spPr>
+          <a:xfrm>
+            <a:off x="9810976" y="2950913"/>
+            <a:ext cx="1884740" cy="1884740"/>
+          </a:xfrm>
+          <a:prstGeom prst="rect">
+            <a:avLst/>
+          </a:prstGeom>
+        </p:spPr>
+      </p:pic>
+    </p:spTree>
+    <p:extLst>
+      <p:ext uri="{BB962C8B-B14F-4D97-AF65-F5344CB8AC3E}">
+        <p14:creationId xmlns:p14="http://schemas.microsoft.com/office/powerpoint/2010/main" val="3727720230"/>
+      </p:ext>
+    </p:extLst>
+  </p:cSld>
+  <p:clrMapOvr>
+    <a:masterClrMapping/>
+  </p:clrMapOvr>
+</p:sld>
+</file>
+
+<file path=ppt/slides/slide15.xml><?xml version="1.0" encoding="utf-8"?>
+<p:sld xmlns:a="http://schemas.openxmlformats.org/drawingml/2006/main" xmlns:r="http://schemas.openxmlformats.org/officeDocument/2006/relationships" xmlns:p="http://schemas.openxmlformats.org/presentationml/2006/main">
+  <p:cSld>
+    <p:bg>
+      <p:bgPr>
+        <a:solidFill>
+          <a:srgbClr val="FFEDCD"/>
+        </a:solidFill>
+        <a:effectLst/>
+      </p:bgPr>
+    </p:bg>
+    <p:spTree>
+      <p:nvGrpSpPr>
+        <p:cNvPr id="1" name=""/>
+        <p:cNvGrpSpPr/>
+        <p:nvPr/>
+      </p:nvGrpSpPr>
+      <p:grpSpPr>
+        <a:xfrm>
+          <a:off x="0" y="0"/>
+          <a:ext cx="0" cy="0"/>
+          <a:chOff x="0" y="0"/>
+          <a:chExt cx="0" cy="0"/>
+        </a:xfrm>
+      </p:grpSpPr>
+      <p:grpSp>
+        <p:nvGrpSpPr>
+          <p:cNvPr id="20" name="그룹 19">
+            <a:extLst>
+              <a:ext uri="{FF2B5EF4-FFF2-40B4-BE49-F238E27FC236}">
+                <a16:creationId xmlns:a16="http://schemas.microsoft.com/office/drawing/2014/main" id="{FB6328CA-21F0-2C1D-7F52-4745C714636D}"/>
+              </a:ext>
+            </a:extLst>
+          </p:cNvPr>
+          <p:cNvGrpSpPr/>
+          <p:nvPr/>
+        </p:nvGrpSpPr>
+        <p:grpSpPr>
+          <a:xfrm>
+            <a:off x="455384" y="-31785"/>
+            <a:ext cx="11393190" cy="1428547"/>
+            <a:chOff x="455384" y="-31785"/>
+            <a:chExt cx="11393190" cy="1428547"/>
+          </a:xfrm>
+        </p:grpSpPr>
+        <p:sp>
+          <p:nvSpPr>
+            <p:cNvPr id="16" name="자유형: 도형 15">
+              <a:extLst>
+                <a:ext uri="{FF2B5EF4-FFF2-40B4-BE49-F238E27FC236}">
+                  <a16:creationId xmlns:a16="http://schemas.microsoft.com/office/drawing/2014/main" id="{E64C6551-745E-CC85-F1B5-777E1217912F}"/>
+                </a:ext>
+              </a:extLst>
+            </p:cNvPr>
+            <p:cNvSpPr/>
+            <p:nvPr/>
+          </p:nvSpPr>
+          <p:spPr>
+            <a:xfrm>
+              <a:off x="455384" y="-1"/>
+              <a:ext cx="11393190" cy="1144019"/>
+            </a:xfrm>
+            <a:custGeom>
+              <a:avLst/>
+              <a:gdLst>
+                <a:gd name="connsiteX0" fmla="*/ 10221266 w 11393190"/>
+                <a:gd name="connsiteY0" fmla="*/ 0 h 1144019"/>
+                <a:gd name="connsiteX1" fmla="*/ 11393190 w 11393190"/>
+                <a:gd name="connsiteY1" fmla="*/ 0 h 1144019"/>
+                <a:gd name="connsiteX2" fmla="*/ 10284025 w 11393190"/>
+                <a:gd name="connsiteY2" fmla="*/ 1109165 h 1144019"/>
+                <a:gd name="connsiteX3" fmla="*/ 10206573 w 11393190"/>
+                <a:gd name="connsiteY3" fmla="*/ 1141247 h 1144019"/>
+                <a:gd name="connsiteX4" fmla="*/ 10203593 w 11393190"/>
+                <a:gd name="connsiteY4" fmla="*/ 1140667 h 1144019"/>
+                <a:gd name="connsiteX5" fmla="*/ 10186991 w 11393190"/>
+                <a:gd name="connsiteY5" fmla="*/ 1144019 h 1144019"/>
+                <a:gd name="connsiteX6" fmla="*/ 109534 w 11393190"/>
+                <a:gd name="connsiteY6" fmla="*/ 1144019 h 1144019"/>
+                <a:gd name="connsiteX7" fmla="*/ 0 w 11393190"/>
+                <a:gd name="connsiteY7" fmla="*/ 1034485 h 1144019"/>
+                <a:gd name="connsiteX8" fmla="*/ 0 w 11393190"/>
+                <a:gd name="connsiteY8" fmla="*/ 424878 h 1144019"/>
+                <a:gd name="connsiteX9" fmla="*/ 109534 w 11393190"/>
+                <a:gd name="connsiteY9" fmla="*/ 315344 h 1144019"/>
+                <a:gd name="connsiteX10" fmla="*/ 9905922 w 11393190"/>
+                <a:gd name="connsiteY10" fmla="*/ 315344 h 1144019"/>
+              </a:gdLst>
+              <a:ahLst/>
+              <a:cxnLst>
+                <a:cxn ang="0">
+                  <a:pos x="connsiteX0" y="connsiteY0"/>
+                </a:cxn>
+                <a:cxn ang="0">
+                  <a:pos x="connsiteX1" y="connsiteY1"/>
+                </a:cxn>
+                <a:cxn ang="0">
+                  <a:pos x="connsiteX2" y="connsiteY2"/>
+                </a:cxn>
+                <a:cxn ang="0">
+                  <a:pos x="connsiteX3" y="connsiteY3"/>
+                </a:cxn>
+                <a:cxn ang="0">
+                  <a:pos x="connsiteX4" y="connsiteY4"/>
+                </a:cxn>
+                <a:cxn ang="0">
+                  <a:pos x="connsiteX5" y="connsiteY5"/>
+                </a:cxn>
+                <a:cxn ang="0">
+                  <a:pos x="connsiteX6" y="connsiteY6"/>
+                </a:cxn>
+                <a:cxn ang="0">
+                  <a:pos x="connsiteX7" y="connsiteY7"/>
+                </a:cxn>
+                <a:cxn ang="0">
+                  <a:pos x="connsiteX8" y="connsiteY8"/>
+                </a:cxn>
+                <a:cxn ang="0">
+                  <a:pos x="connsiteX9" y="connsiteY9"/>
+                </a:cxn>
+                <a:cxn ang="0">
+                  <a:pos x="connsiteX10" y="connsiteY10"/>
+                </a:cxn>
+              </a:cxnLst>
+              <a:rect l="l" t="t" r="r" b="b"/>
+              <a:pathLst>
+                <a:path w="11393190" h="1144019">
+                  <a:moveTo>
+                    <a:pt x="10221266" y="0"/>
+                  </a:moveTo>
+                  <a:lnTo>
+                    <a:pt x="11393190" y="0"/>
+                  </a:lnTo>
+                  <a:lnTo>
+                    <a:pt x="10284025" y="1109165"/>
+                  </a:lnTo>
+                  <a:cubicBezTo>
+                    <a:pt x="10262637" y="1130553"/>
+                    <a:pt x="10234605" y="1141247"/>
+                    <a:pt x="10206573" y="1141247"/>
+                  </a:cubicBezTo>
+                  <a:lnTo>
+                    <a:pt x="10203593" y="1140667"/>
+                  </a:lnTo>
+                  <a:lnTo>
+                    <a:pt x="10186991" y="1144019"/>
+                  </a:lnTo>
+                  <a:lnTo>
+                    <a:pt x="109534" y="1144019"/>
+                  </a:lnTo>
+                  <a:cubicBezTo>
+                    <a:pt x="49040" y="1144019"/>
+                    <a:pt x="0" y="1094979"/>
+                    <a:pt x="0" y="1034485"/>
+                  </a:cubicBezTo>
+                  <a:lnTo>
+                    <a:pt x="0" y="424878"/>
+                  </a:lnTo>
+                  <a:cubicBezTo>
+                    <a:pt x="0" y="364384"/>
+                    <a:pt x="49040" y="315344"/>
+                    <a:pt x="109534" y="315344"/>
+                  </a:cubicBezTo>
+                  <a:lnTo>
+                    <a:pt x="9905922" y="315344"/>
+                  </a:lnTo>
+                  <a:close/>
+                </a:path>
+              </a:pathLst>
+            </a:custGeom>
+            <a:solidFill>
+              <a:srgbClr val="F15A21"/>
+            </a:solidFill>
+            <a:ln w="38100">
+              <a:solidFill>
+                <a:schemeClr val="tx1">
+                  <a:lumMod val="95000"/>
+                  <a:lumOff val="5000"/>
+                </a:schemeClr>
+              </a:solidFill>
+            </a:ln>
+          </p:spPr>
+          <p:style>
+            <a:lnRef idx="2">
+              <a:schemeClr val="accent1">
+                <a:shade val="50000"/>
+              </a:schemeClr>
+            </a:lnRef>
+            <a:fillRef idx="1">
+              <a:schemeClr val="accent1"/>
+            </a:fillRef>
+            <a:effectRef idx="0">
+              <a:schemeClr val="accent1"/>
+            </a:effectRef>
+            <a:fontRef idx="minor">
+              <a:schemeClr val="lt1"/>
+            </a:fontRef>
+          </p:style>
+          <p:txBody>
+            <a:bodyPr wrap="square" rtlCol="0" anchor="ctr">
+              <a:noAutofit/>
+            </a:bodyPr>
+            <a:lstStyle/>
+            <a:p>
+              <a:pPr algn="ctr">
+                <a:defRPr/>
+              </a:pPr>
+              <a:endParaRPr lang="ko-KR" altLang="en-US">
+                <a:solidFill>
+                  <a:prstClr val="white"/>
+                </a:solidFill>
+              </a:endParaRPr>
+            </a:p>
+          </p:txBody>
+        </p:sp>
+        <p:sp>
+          <p:nvSpPr>
+            <p:cNvPr id="19" name="자유형: 도형 18">
+              <a:extLst>
+                <a:ext uri="{FF2B5EF4-FFF2-40B4-BE49-F238E27FC236}">
+                  <a16:creationId xmlns:a16="http://schemas.microsoft.com/office/drawing/2014/main" id="{3BF90A0B-806C-6199-5647-CB982CB169D5}"/>
+                </a:ext>
+              </a:extLst>
+            </p:cNvPr>
+            <p:cNvSpPr/>
+            <p:nvPr/>
+          </p:nvSpPr>
+          <p:spPr>
+            <a:xfrm>
+              <a:off x="598259" y="0"/>
+              <a:ext cx="11097462" cy="1029718"/>
+            </a:xfrm>
+            <a:custGeom>
+              <a:avLst/>
+              <a:gdLst>
+                <a:gd name="connsiteX0" fmla="*/ 10087183 w 11097462"/>
+                <a:gd name="connsiteY0" fmla="*/ 0 h 1029718"/>
+                <a:gd name="connsiteX1" fmla="*/ 11097462 w 11097462"/>
+                <a:gd name="connsiteY1" fmla="*/ 0 h 1029718"/>
+                <a:gd name="connsiteX2" fmla="*/ 10095285 w 11097462"/>
+                <a:gd name="connsiteY2" fmla="*/ 1002177 h 1029718"/>
+                <a:gd name="connsiteX3" fmla="*/ 10038771 w 11097462"/>
+                <a:gd name="connsiteY3" fmla="*/ 1025586 h 1029718"/>
+                <a:gd name="connsiteX4" fmla="*/ 10031425 w 11097462"/>
+                <a:gd name="connsiteY4" fmla="*/ 1024156 h 1029718"/>
+                <a:gd name="connsiteX5" fmla="*/ 10003877 w 11097462"/>
+                <a:gd name="connsiteY5" fmla="*/ 1029718 h 1029718"/>
+                <a:gd name="connsiteX6" fmla="*/ 79924 w 11097462"/>
+                <a:gd name="connsiteY6" fmla="*/ 1029718 h 1029718"/>
+                <a:gd name="connsiteX7" fmla="*/ 0 w 11097462"/>
+                <a:gd name="connsiteY7" fmla="*/ 949794 h 1029718"/>
+                <a:gd name="connsiteX8" fmla="*/ 0 w 11097462"/>
+                <a:gd name="connsiteY8" fmla="*/ 395267 h 1029718"/>
+                <a:gd name="connsiteX9" fmla="*/ 79924 w 11097462"/>
+                <a:gd name="connsiteY9" fmla="*/ 315343 h 1029718"/>
+                <a:gd name="connsiteX10" fmla="*/ 9771840 w 11097462"/>
+                <a:gd name="connsiteY10" fmla="*/ 315343 h 1029718"/>
+              </a:gdLst>
+              <a:ahLst/>
+              <a:cxnLst>
+                <a:cxn ang="0">
+                  <a:pos x="connsiteX0" y="connsiteY0"/>
+                </a:cxn>
+                <a:cxn ang="0">
+                  <a:pos x="connsiteX1" y="connsiteY1"/>
+                </a:cxn>
+                <a:cxn ang="0">
+                  <a:pos x="connsiteX2" y="connsiteY2"/>
+                </a:cxn>
+                <a:cxn ang="0">
+                  <a:pos x="connsiteX3" y="connsiteY3"/>
+                </a:cxn>
+                <a:cxn ang="0">
+                  <a:pos x="connsiteX4" y="connsiteY4"/>
+                </a:cxn>
+                <a:cxn ang="0">
+                  <a:pos x="connsiteX5" y="connsiteY5"/>
+                </a:cxn>
+                <a:cxn ang="0">
+                  <a:pos x="connsiteX6" y="connsiteY6"/>
+                </a:cxn>
+                <a:cxn ang="0">
+                  <a:pos x="connsiteX7" y="connsiteY7"/>
+                </a:cxn>
+                <a:cxn ang="0">
+                  <a:pos x="connsiteX8" y="connsiteY8"/>
+                </a:cxn>
+                <a:cxn ang="0">
+                  <a:pos x="connsiteX9" y="connsiteY9"/>
+                </a:cxn>
+                <a:cxn ang="0">
+                  <a:pos x="connsiteX10" y="connsiteY10"/>
+                </a:cxn>
+              </a:cxnLst>
+              <a:rect l="l" t="t" r="r" b="b"/>
+              <a:pathLst>
+                <a:path w="11097462" h="1029718">
+                  <a:moveTo>
+                    <a:pt x="10087183" y="0"/>
+                  </a:moveTo>
+                  <a:lnTo>
+                    <a:pt x="11097462" y="0"/>
+                  </a:lnTo>
+                  <a:lnTo>
+                    <a:pt x="10095285" y="1002177"/>
+                  </a:lnTo>
+                  <a:cubicBezTo>
+                    <a:pt x="10079679" y="1017783"/>
+                    <a:pt x="10059225" y="1025586"/>
+                    <a:pt x="10038771" y="1025586"/>
+                  </a:cubicBezTo>
+                  <a:lnTo>
+                    <a:pt x="10031425" y="1024156"/>
+                  </a:lnTo>
+                  <a:lnTo>
+                    <a:pt x="10003877" y="1029718"/>
+                  </a:lnTo>
+                  <a:lnTo>
+                    <a:pt x="79924" y="1029718"/>
+                  </a:lnTo>
+                  <a:cubicBezTo>
+                    <a:pt x="35783" y="1029718"/>
+                    <a:pt x="0" y="993935"/>
+                    <a:pt x="0" y="949794"/>
+                  </a:cubicBezTo>
+                  <a:lnTo>
+                    <a:pt x="0" y="395267"/>
+                  </a:lnTo>
+                  <a:cubicBezTo>
+                    <a:pt x="0" y="351126"/>
+                    <a:pt x="35783" y="315343"/>
+                    <a:pt x="79924" y="315343"/>
+                  </a:cubicBezTo>
+                  <a:lnTo>
+                    <a:pt x="9771840" y="315343"/>
+                  </a:lnTo>
+                  <a:close/>
+                </a:path>
+              </a:pathLst>
+            </a:custGeom>
+            <a:solidFill>
+              <a:schemeClr val="bg1"/>
+            </a:solidFill>
+            <a:ln w="38100">
+              <a:solidFill>
+                <a:schemeClr val="tx1">
+                  <a:lumMod val="95000"/>
+                  <a:lumOff val="5000"/>
+                </a:schemeClr>
+              </a:solidFill>
+            </a:ln>
+            <a:effectLst/>
+          </p:spPr>
+          <p:style>
+            <a:lnRef idx="2">
+              <a:schemeClr val="accent1">
+                <a:shade val="50000"/>
+              </a:schemeClr>
+            </a:lnRef>
+            <a:fillRef idx="1">
+              <a:schemeClr val="accent1"/>
+            </a:fillRef>
+            <a:effectRef idx="0">
+              <a:schemeClr val="accent1"/>
+            </a:effectRef>
+            <a:fontRef idx="minor">
+              <a:schemeClr val="lt1"/>
+            </a:fontRef>
+          </p:style>
+          <p:txBody>
+            <a:bodyPr wrap="square" rtlCol="0" anchor="ctr">
+              <a:noAutofit/>
+            </a:bodyPr>
+            <a:lstStyle/>
+            <a:p>
+              <a:pPr algn="ctr">
+                <a:defRPr/>
+              </a:pPr>
+              <a:endParaRPr lang="ko-KR" altLang="en-US">
+                <a:solidFill>
+                  <a:prstClr val="white"/>
+                </a:solidFill>
+              </a:endParaRPr>
+            </a:p>
+          </p:txBody>
+        </p:sp>
+        <p:sp>
+          <p:nvSpPr>
+            <p:cNvPr id="5" name="자유형: 도형 4">
+              <a:extLst>
+                <a:ext uri="{FF2B5EF4-FFF2-40B4-BE49-F238E27FC236}">
+                  <a16:creationId xmlns:a16="http://schemas.microsoft.com/office/drawing/2014/main" id="{BA5A35FA-D56B-6958-CCCF-E9A4F202E6F9}"/>
+                </a:ext>
+              </a:extLst>
+            </p:cNvPr>
+            <p:cNvSpPr/>
+            <p:nvPr/>
+          </p:nvSpPr>
+          <p:spPr>
+            <a:xfrm>
+              <a:off x="579119" y="-31785"/>
+              <a:ext cx="11116597" cy="1029718"/>
+            </a:xfrm>
+            <a:custGeom>
+              <a:avLst/>
+              <a:gdLst>
+                <a:gd name="connsiteX0" fmla="*/ 9632199 w 11116597"/>
+                <a:gd name="connsiteY0" fmla="*/ 0 h 1029718"/>
+                <a:gd name="connsiteX1" fmla="*/ 11116597 w 11116597"/>
+                <a:gd name="connsiteY1" fmla="*/ 0 h 1029718"/>
+                <a:gd name="connsiteX2" fmla="*/ 10372629 w 11116597"/>
+                <a:gd name="connsiteY2" fmla="*/ 743968 h 1029718"/>
+                <a:gd name="connsiteX3" fmla="*/ 10075587 w 11116597"/>
+                <a:gd name="connsiteY3" fmla="*/ 1029718 h 1029718"/>
+                <a:gd name="connsiteX4" fmla="*/ 10081608 w 11116597"/>
+                <a:gd name="connsiteY4" fmla="*/ 688673 h 1029718"/>
+                <a:gd name="connsiteX5" fmla="*/ 10083080 w 11116597"/>
+                <a:gd name="connsiteY5" fmla="*/ 540467 h 1029718"/>
+                <a:gd name="connsiteX6" fmla="*/ 10079100 w 11116597"/>
+                <a:gd name="connsiteY6" fmla="*/ 550075 h 1029718"/>
+                <a:gd name="connsiteX7" fmla="*/ 10065617 w 11116597"/>
+                <a:gd name="connsiteY7" fmla="*/ 555660 h 1029718"/>
+                <a:gd name="connsiteX8" fmla="*/ 19068 w 11116597"/>
+                <a:gd name="connsiteY8" fmla="*/ 555660 h 1029718"/>
+                <a:gd name="connsiteX9" fmla="*/ 0 w 11116597"/>
+                <a:gd name="connsiteY9" fmla="*/ 536592 h 1029718"/>
+                <a:gd name="connsiteX10" fmla="*/ 0 w 11116597"/>
+                <a:gd name="connsiteY10" fmla="*/ 404296 h 1029718"/>
+                <a:gd name="connsiteX11" fmla="*/ 19068 w 11116597"/>
+                <a:gd name="connsiteY11" fmla="*/ 385228 h 1029718"/>
+                <a:gd name="connsiteX12" fmla="*/ 10065617 w 11116597"/>
+                <a:gd name="connsiteY12" fmla="*/ 385228 h 1029718"/>
+                <a:gd name="connsiteX13" fmla="*/ 10084685 w 11116597"/>
+                <a:gd name="connsiteY13" fmla="*/ 404296 h 1029718"/>
+                <a:gd name="connsiteX14" fmla="*/ 10084685 w 11116597"/>
+                <a:gd name="connsiteY14" fmla="*/ 445614 h 1029718"/>
+                <a:gd name="connsiteX15" fmla="*/ 10087630 w 11116597"/>
+                <a:gd name="connsiteY15" fmla="*/ 315480 h 1029718"/>
+                <a:gd name="connsiteX16" fmla="*/ 9630430 w 11116597"/>
+                <a:gd name="connsiteY16" fmla="*/ 1769 h 1029718"/>
+              </a:gdLst>
+              <a:ahLst/>
+              <a:cxnLst>
+                <a:cxn ang="0">
+                  <a:pos x="connsiteX0" y="connsiteY0"/>
+                </a:cxn>
+                <a:cxn ang="0">
+                  <a:pos x="connsiteX1" y="connsiteY1"/>
+                </a:cxn>
+                <a:cxn ang="0">
+                  <a:pos x="connsiteX2" y="connsiteY2"/>
+                </a:cxn>
+                <a:cxn ang="0">
+                  <a:pos x="connsiteX3" y="connsiteY3"/>
+                </a:cxn>
+                <a:cxn ang="0">
+                  <a:pos x="connsiteX4" y="connsiteY4"/>
+                </a:cxn>
+                <a:cxn ang="0">
+                  <a:pos x="connsiteX5" y="connsiteY5"/>
+                </a:cxn>
+                <a:cxn ang="0">
+                  <a:pos x="connsiteX6" y="connsiteY6"/>
+                </a:cxn>
+                <a:cxn ang="0">
+                  <a:pos x="connsiteX7" y="connsiteY7"/>
+                </a:cxn>
+                <a:cxn ang="0">
+                  <a:pos x="connsiteX8" y="connsiteY8"/>
+                </a:cxn>
+                <a:cxn ang="0">
+                  <a:pos x="connsiteX9" y="connsiteY9"/>
+                </a:cxn>
+                <a:cxn ang="0">
+                  <a:pos x="connsiteX10" y="connsiteY10"/>
+                </a:cxn>
+                <a:cxn ang="0">
+                  <a:pos x="connsiteX11" y="connsiteY11"/>
+                </a:cxn>
+                <a:cxn ang="0">
+                  <a:pos x="connsiteX12" y="connsiteY12"/>
+                </a:cxn>
+                <a:cxn ang="0">
+                  <a:pos x="connsiteX13" y="connsiteY13"/>
+                </a:cxn>
+                <a:cxn ang="0">
+                  <a:pos x="connsiteX14" y="connsiteY14"/>
+                </a:cxn>
+                <a:cxn ang="0">
+                  <a:pos x="connsiteX15" y="connsiteY15"/>
+                </a:cxn>
+                <a:cxn ang="0">
+                  <a:pos x="connsiteX16" y="connsiteY16"/>
+                </a:cxn>
+              </a:cxnLst>
+              <a:rect l="l" t="t" r="r" b="b"/>
+              <a:pathLst>
+                <a:path w="11116597" h="1029718">
+                  <a:moveTo>
+                    <a:pt x="9632199" y="0"/>
+                  </a:moveTo>
+                  <a:lnTo>
+                    <a:pt x="11116597" y="0"/>
+                  </a:lnTo>
+                  <a:lnTo>
+                    <a:pt x="10372629" y="743968"/>
+                  </a:lnTo>
+                  <a:cubicBezTo>
+                    <a:pt x="10326769" y="789828"/>
+                    <a:pt x="10130971" y="1011283"/>
+                    <a:pt x="10075587" y="1029718"/>
+                  </a:cubicBezTo>
+                  <a:cubicBezTo>
+                    <a:pt x="10079578" y="936078"/>
+                    <a:pt x="10080593" y="815054"/>
+                    <a:pt x="10081608" y="688673"/>
+                  </a:cubicBezTo>
+                  <a:lnTo>
+                    <a:pt x="10083080" y="540467"/>
+                  </a:lnTo>
+                  <a:lnTo>
+                    <a:pt x="10079100" y="550075"/>
+                  </a:lnTo>
+                  <a:cubicBezTo>
+                    <a:pt x="10075650" y="553526"/>
+                    <a:pt x="10070883" y="555660"/>
+                    <a:pt x="10065617" y="555660"/>
+                  </a:cubicBezTo>
+                  <a:lnTo>
+                    <a:pt x="19068" y="555660"/>
+                  </a:lnTo>
+                  <a:cubicBezTo>
+                    <a:pt x="8537" y="555660"/>
+                    <a:pt x="0" y="547123"/>
+                    <a:pt x="0" y="536592"/>
+                  </a:cubicBezTo>
+                  <a:lnTo>
+                    <a:pt x="0" y="404296"/>
+                  </a:lnTo>
+                  <a:cubicBezTo>
+                    <a:pt x="0" y="393765"/>
+                    <a:pt x="8537" y="385228"/>
+                    <a:pt x="19068" y="385228"/>
+                  </a:cubicBezTo>
+                  <a:lnTo>
+                    <a:pt x="10065617" y="385228"/>
+                  </a:lnTo>
+                  <a:cubicBezTo>
+                    <a:pt x="10076148" y="385228"/>
+                    <a:pt x="10084685" y="393765"/>
+                    <a:pt x="10084685" y="404296"/>
+                  </a:cubicBezTo>
+                  <a:lnTo>
+                    <a:pt x="10084685" y="445614"/>
+                  </a:lnTo>
+                  <a:lnTo>
+                    <a:pt x="10087630" y="315480"/>
+                  </a:lnTo>
+                  <a:cubicBezTo>
+                    <a:pt x="10041770" y="269620"/>
+                    <a:pt x="9584570" y="47629"/>
+                    <a:pt x="9630430" y="1769"/>
+                  </a:cubicBezTo>
+                  <a:close/>
+                </a:path>
+              </a:pathLst>
+            </a:custGeom>
+            <a:solidFill>
+              <a:schemeClr val="accent1">
+                <a:alpha val="25000"/>
+              </a:schemeClr>
+            </a:solidFill>
+            <a:ln w="38100">
+              <a:noFill/>
+            </a:ln>
+            <a:effectLst/>
+          </p:spPr>
+          <p:style>
+            <a:lnRef idx="2">
+              <a:schemeClr val="accent1">
+                <a:shade val="50000"/>
+              </a:schemeClr>
+            </a:lnRef>
+            <a:fillRef idx="1">
+              <a:schemeClr val="accent1"/>
+            </a:fillRef>
+            <a:effectRef idx="0">
+              <a:schemeClr val="accent1"/>
+            </a:effectRef>
+            <a:fontRef idx="minor">
+              <a:schemeClr val="lt1"/>
+            </a:fontRef>
+          </p:style>
+          <p:txBody>
+            <a:bodyPr wrap="square" rtlCol="0" anchor="ctr">
+              <a:noAutofit/>
+            </a:bodyPr>
+            <a:lstStyle/>
+            <a:p>
+              <a:pPr algn="ctr">
+                <a:defRPr/>
+              </a:pPr>
+              <a:endParaRPr lang="ko-KR" altLang="en-US">
+                <a:solidFill>
+                  <a:prstClr val="white"/>
+                </a:solidFill>
+              </a:endParaRPr>
+            </a:p>
+          </p:txBody>
+        </p:sp>
+        <p:sp>
+          <p:nvSpPr>
+            <p:cNvPr id="8" name="평행 사변형 7">
+              <a:extLst>
+                <a:ext uri="{FF2B5EF4-FFF2-40B4-BE49-F238E27FC236}">
+                  <a16:creationId xmlns:a16="http://schemas.microsoft.com/office/drawing/2014/main" id="{B9003670-0CB9-C3D9-CB6A-C0CB3E07759C}"/>
+                </a:ext>
+              </a:extLst>
+            </p:cNvPr>
+            <p:cNvSpPr/>
+            <p:nvPr/>
+          </p:nvSpPr>
+          <p:spPr>
+            <a:xfrm>
+              <a:off x="462722" y="0"/>
+              <a:ext cx="10557703" cy="353443"/>
+            </a:xfrm>
+            <a:prstGeom prst="parallelogram">
+              <a:avLst>
+                <a:gd name="adj" fmla="val 99713"/>
+              </a:avLst>
+            </a:prstGeom>
+            <a:solidFill>
+              <a:srgbClr val="F15A21"/>
+            </a:solidFill>
+            <a:ln w="38100">
+              <a:solidFill>
+                <a:schemeClr val="tx1">
+                  <a:lumMod val="95000"/>
+                  <a:lumOff val="5000"/>
+                </a:schemeClr>
+              </a:solidFill>
+              <a:round/>
+            </a:ln>
+          </p:spPr>
+          <p:style>
+            <a:lnRef idx="2">
+              <a:schemeClr val="accent1">
+                <a:shade val="50000"/>
+              </a:schemeClr>
+            </a:lnRef>
+            <a:fillRef idx="1">
+              <a:schemeClr val="accent1"/>
+            </a:fillRef>
+            <a:effectRef idx="0">
+              <a:schemeClr val="accent1"/>
+            </a:effectRef>
+            <a:fontRef idx="minor">
+              <a:schemeClr val="lt1"/>
+            </a:fontRef>
+          </p:style>
+          <p:txBody>
+            <a:bodyPr rtlCol="0" anchor="ctr"/>
+            <a:lstStyle/>
+            <a:p>
+              <a:pPr algn="ctr">
+                <a:defRPr/>
+              </a:pPr>
+              <a:endParaRPr lang="ko-KR" altLang="en-US">
+                <a:solidFill>
+                  <a:prstClr val="white"/>
+                </a:solidFill>
+              </a:endParaRPr>
+            </a:p>
+          </p:txBody>
+        </p:sp>
+        <p:cxnSp>
+          <p:nvCxnSpPr>
+            <p:cNvPr id="6" name="직선 연결선 5">
+              <a:extLst>
+                <a:ext uri="{FF2B5EF4-FFF2-40B4-BE49-F238E27FC236}">
+                  <a16:creationId xmlns:a16="http://schemas.microsoft.com/office/drawing/2014/main" id="{9AC97124-06C1-C03C-3E30-298E524D227E}"/>
+                </a:ext>
+              </a:extLst>
+            </p:cNvPr>
+            <p:cNvCxnSpPr>
+              <a:cxnSpLocks/>
+            </p:cNvCxnSpPr>
+            <p:nvPr/>
+          </p:nvCxnSpPr>
+          <p:spPr>
+            <a:xfrm rot="18900000">
+              <a:off x="10864508" y="226747"/>
+              <a:ext cx="612000" cy="0"/>
+            </a:xfrm>
+            <a:prstGeom prst="line">
+              <a:avLst/>
+            </a:prstGeom>
+            <a:ln>
+              <a:solidFill>
+                <a:schemeClr val="tx1">
+                  <a:lumMod val="95000"/>
+                  <a:lumOff val="5000"/>
+                </a:schemeClr>
+              </a:solidFill>
+            </a:ln>
+          </p:spPr>
+          <p:style>
+            <a:lnRef idx="1">
+              <a:schemeClr val="accent1"/>
+            </a:lnRef>
+            <a:fillRef idx="0">
+              <a:schemeClr val="accent1"/>
+            </a:fillRef>
+            <a:effectRef idx="0">
+              <a:schemeClr val="accent1"/>
+            </a:effectRef>
+            <a:fontRef idx="minor">
+              <a:schemeClr val="tx1"/>
+            </a:fontRef>
+          </p:style>
+        </p:cxnSp>
+        <p:cxnSp>
+          <p:nvCxnSpPr>
+            <p:cNvPr id="12" name="직선 연결선 11">
+              <a:extLst>
+                <a:ext uri="{FF2B5EF4-FFF2-40B4-BE49-F238E27FC236}">
+                  <a16:creationId xmlns:a16="http://schemas.microsoft.com/office/drawing/2014/main" id="{4EBADE62-4253-8AC7-1EEA-2264355B18A1}"/>
+                </a:ext>
+              </a:extLst>
+            </p:cNvPr>
+            <p:cNvCxnSpPr>
+              <a:cxnSpLocks/>
+            </p:cNvCxnSpPr>
+            <p:nvPr/>
+          </p:nvCxnSpPr>
+          <p:spPr>
+            <a:xfrm rot="18900000">
+              <a:off x="10633731" y="457887"/>
+              <a:ext cx="720000" cy="0"/>
+            </a:xfrm>
+            <a:prstGeom prst="line">
+              <a:avLst/>
+            </a:prstGeom>
+            <a:ln>
+              <a:solidFill>
+                <a:schemeClr val="tx1">
+                  <a:lumMod val="95000"/>
+                  <a:lumOff val="5000"/>
+                </a:schemeClr>
+              </a:solidFill>
+            </a:ln>
+          </p:spPr>
+          <p:style>
+            <a:lnRef idx="1">
+              <a:schemeClr val="accent1"/>
+            </a:lnRef>
+            <a:fillRef idx="0">
+              <a:schemeClr val="accent1"/>
+            </a:fillRef>
+            <a:effectRef idx="0">
+              <a:schemeClr val="accent1"/>
+            </a:effectRef>
+            <a:fontRef idx="minor">
+              <a:schemeClr val="tx1"/>
+            </a:fontRef>
+          </p:style>
+        </p:cxnSp>
+        <p:cxnSp>
+          <p:nvCxnSpPr>
+            <p:cNvPr id="13" name="직선 연결선 12">
+              <a:extLst>
+                <a:ext uri="{FF2B5EF4-FFF2-40B4-BE49-F238E27FC236}">
+                  <a16:creationId xmlns:a16="http://schemas.microsoft.com/office/drawing/2014/main" id="{E57EAF6C-E978-CB93-B94E-DE2B29DDB589}"/>
+                </a:ext>
+              </a:extLst>
+            </p:cNvPr>
+            <p:cNvCxnSpPr>
+              <a:cxnSpLocks/>
+            </p:cNvCxnSpPr>
+            <p:nvPr/>
+          </p:nvCxnSpPr>
+          <p:spPr>
+            <a:xfrm rot="18900000">
+              <a:off x="10856160" y="354506"/>
+              <a:ext cx="576000" cy="0"/>
+            </a:xfrm>
+            <a:prstGeom prst="line">
+              <a:avLst/>
+            </a:prstGeom>
+            <a:ln>
+              <a:solidFill>
+                <a:schemeClr val="tx1">
+                  <a:lumMod val="95000"/>
+                  <a:lumOff val="5000"/>
+                </a:schemeClr>
+              </a:solidFill>
+            </a:ln>
+          </p:spPr>
+          <p:style>
+            <a:lnRef idx="1">
+              <a:schemeClr val="accent1"/>
+            </a:lnRef>
+            <a:fillRef idx="0">
+              <a:schemeClr val="accent1"/>
+            </a:fillRef>
+            <a:effectRef idx="0">
+              <a:schemeClr val="accent1"/>
+            </a:effectRef>
+            <a:fontRef idx="minor">
+              <a:schemeClr val="tx1"/>
+            </a:fontRef>
+          </p:style>
+        </p:cxnSp>
+        <p:cxnSp>
+          <p:nvCxnSpPr>
+            <p:cNvPr id="14" name="직선 연결선 13">
+              <a:extLst>
+                <a:ext uri="{FF2B5EF4-FFF2-40B4-BE49-F238E27FC236}">
+                  <a16:creationId xmlns:a16="http://schemas.microsoft.com/office/drawing/2014/main" id="{62ACB5FA-26EA-343B-9E6F-B7AC9EDBDBBA}"/>
+                </a:ext>
+              </a:extLst>
+            </p:cNvPr>
+            <p:cNvCxnSpPr>
+              <a:cxnSpLocks/>
+            </p:cNvCxnSpPr>
+            <p:nvPr/>
+          </p:nvCxnSpPr>
+          <p:spPr>
+            <a:xfrm>
+              <a:off x="892691" y="710128"/>
+              <a:ext cx="720000" cy="0"/>
+            </a:xfrm>
+            <a:prstGeom prst="line">
+              <a:avLst/>
+            </a:prstGeom>
+            <a:ln w="41275" cap="rnd">
+              <a:solidFill>
+                <a:schemeClr val="tx1">
+                  <a:lumMod val="95000"/>
+                  <a:lumOff val="5000"/>
+                </a:schemeClr>
+              </a:solidFill>
+            </a:ln>
+          </p:spPr>
+          <p:style>
+            <a:lnRef idx="1">
+              <a:schemeClr val="accent1"/>
+            </a:lnRef>
+            <a:fillRef idx="0">
+              <a:schemeClr val="accent1"/>
+            </a:fillRef>
+            <a:effectRef idx="0">
+              <a:schemeClr val="accent1"/>
+            </a:effectRef>
+            <a:fontRef idx="minor">
+              <a:schemeClr val="tx1"/>
+            </a:fontRef>
+          </p:style>
+        </p:cxnSp>
+        <p:sp>
+          <p:nvSpPr>
+            <p:cNvPr id="23" name="자유형: 도형 22">
+              <a:extLst>
+                <a:ext uri="{FF2B5EF4-FFF2-40B4-BE49-F238E27FC236}">
+                  <a16:creationId xmlns:a16="http://schemas.microsoft.com/office/drawing/2014/main" id="{E3133A7D-9557-EE3E-686B-2EDEF46AD416}"/>
+                </a:ext>
+              </a:extLst>
+            </p:cNvPr>
+            <p:cNvSpPr/>
+            <p:nvPr/>
+          </p:nvSpPr>
+          <p:spPr>
+            <a:xfrm>
+              <a:off x="1034246" y="716835"/>
+              <a:ext cx="436890" cy="679927"/>
+            </a:xfrm>
+            <a:custGeom>
+              <a:avLst/>
+              <a:gdLst>
+                <a:gd name="connsiteX0" fmla="*/ 144463 w 436890"/>
+                <a:gd name="connsiteY0" fmla="*/ 0 h 679927"/>
+                <a:gd name="connsiteX1" fmla="*/ 436890 w 436890"/>
+                <a:gd name="connsiteY1" fmla="*/ 0 h 679927"/>
+                <a:gd name="connsiteX2" fmla="*/ 401338 w 436890"/>
+                <a:gd name="connsiteY2" fmla="*/ 7178 h 679927"/>
+                <a:gd name="connsiteX3" fmla="*/ 308545 w 436890"/>
+                <a:gd name="connsiteY3" fmla="*/ 147170 h 679927"/>
+                <a:gd name="connsiteX4" fmla="*/ 308545 w 436890"/>
+                <a:gd name="connsiteY4" fmla="*/ 366713 h 679927"/>
+                <a:gd name="connsiteX5" fmla="*/ 308545 w 436890"/>
+                <a:gd name="connsiteY5" fmla="*/ 462723 h 679927"/>
+                <a:gd name="connsiteX6" fmla="*/ 308545 w 436890"/>
+                <a:gd name="connsiteY6" fmla="*/ 498036 h 679927"/>
+                <a:gd name="connsiteX7" fmla="*/ 308545 w 436890"/>
+                <a:gd name="connsiteY7" fmla="*/ 679927 h 679927"/>
+                <a:gd name="connsiteX8" fmla="*/ 154273 w 436890"/>
+                <a:gd name="connsiteY8" fmla="*/ 582806 h 679927"/>
+                <a:gd name="connsiteX9" fmla="*/ 0 w 436890"/>
+                <a:gd name="connsiteY9" fmla="*/ 679927 h 679927"/>
+                <a:gd name="connsiteX10" fmla="*/ 0 w 436890"/>
+                <a:gd name="connsiteY10" fmla="*/ 498036 h 679927"/>
+                <a:gd name="connsiteX11" fmla="*/ 0 w 436890"/>
+                <a:gd name="connsiteY11" fmla="*/ 462723 h 679927"/>
+                <a:gd name="connsiteX12" fmla="*/ 0 w 436890"/>
+                <a:gd name="connsiteY12" fmla="*/ 366713 h 679927"/>
+                <a:gd name="connsiteX13" fmla="*/ 0 w 436890"/>
+                <a:gd name="connsiteY13" fmla="*/ 144463 h 679927"/>
+                <a:gd name="connsiteX14" fmla="*/ 0 w 436890"/>
+                <a:gd name="connsiteY14" fmla="*/ 131323 h 679927"/>
+                <a:gd name="connsiteX15" fmla="*/ 2653 w 436890"/>
+                <a:gd name="connsiteY15" fmla="*/ 131323 h 679927"/>
+                <a:gd name="connsiteX16" fmla="*/ 11353 w 436890"/>
+                <a:gd name="connsiteY16" fmla="*/ 88232 h 679927"/>
+                <a:gd name="connsiteX17" fmla="*/ 144463 w 436890"/>
+                <a:gd name="connsiteY17" fmla="*/ 0 h 679927"/>
+              </a:gdLst>
+              <a:ahLst/>
+              <a:cxnLst>
+                <a:cxn ang="0">
+                  <a:pos x="connsiteX0" y="connsiteY0"/>
+                </a:cxn>
+                <a:cxn ang="0">
+                  <a:pos x="connsiteX1" y="connsiteY1"/>
+                </a:cxn>
+                <a:cxn ang="0">
+                  <a:pos x="connsiteX2" y="connsiteY2"/>
+                </a:cxn>
+                <a:cxn ang="0">
+                  <a:pos x="connsiteX3" y="connsiteY3"/>
+                </a:cxn>
+                <a:cxn ang="0">
+                  <a:pos x="connsiteX4" y="connsiteY4"/>
+                </a:cxn>
+                <a:cxn ang="0">
+                  <a:pos x="connsiteX5" y="connsiteY5"/>
+                </a:cxn>
+                <a:cxn ang="0">
+                  <a:pos x="connsiteX6" y="connsiteY6"/>
+                </a:cxn>
+                <a:cxn ang="0">
+                  <a:pos x="connsiteX7" y="connsiteY7"/>
+                </a:cxn>
+                <a:cxn ang="0">
+                  <a:pos x="connsiteX8" y="connsiteY8"/>
+                </a:cxn>
+                <a:cxn ang="0">
+                  <a:pos x="connsiteX9" y="connsiteY9"/>
+                </a:cxn>
+                <a:cxn ang="0">
+                  <a:pos x="connsiteX10" y="connsiteY10"/>
+                </a:cxn>
+                <a:cxn ang="0">
+                  <a:pos x="connsiteX11" y="connsiteY11"/>
+                </a:cxn>
+                <a:cxn ang="0">
+                  <a:pos x="connsiteX12" y="connsiteY12"/>
+                </a:cxn>
+                <a:cxn ang="0">
+                  <a:pos x="connsiteX13" y="connsiteY13"/>
+                </a:cxn>
+                <a:cxn ang="0">
+                  <a:pos x="connsiteX14" y="connsiteY14"/>
+                </a:cxn>
+                <a:cxn ang="0">
+                  <a:pos x="connsiteX15" y="connsiteY15"/>
+                </a:cxn>
+                <a:cxn ang="0">
+                  <a:pos x="connsiteX16" y="connsiteY16"/>
+                </a:cxn>
+                <a:cxn ang="0">
+                  <a:pos x="connsiteX17" y="connsiteY17"/>
+                </a:cxn>
+              </a:cxnLst>
+              <a:rect l="l" t="t" r="r" b="b"/>
+              <a:pathLst>
+                <a:path w="436890" h="679927">
+                  <a:moveTo>
+                    <a:pt x="144463" y="0"/>
+                  </a:moveTo>
+                  <a:lnTo>
+                    <a:pt x="436890" y="0"/>
+                  </a:lnTo>
+                  <a:lnTo>
+                    <a:pt x="401338" y="7178"/>
+                  </a:lnTo>
+                  <a:cubicBezTo>
+                    <a:pt x="346808" y="30242"/>
+                    <a:pt x="308545" y="84238"/>
+                    <a:pt x="308545" y="147170"/>
+                  </a:cubicBezTo>
+                  <a:lnTo>
+                    <a:pt x="308545" y="366713"/>
+                  </a:lnTo>
+                  <a:lnTo>
+                    <a:pt x="308545" y="462723"/>
+                  </a:lnTo>
+                  <a:lnTo>
+                    <a:pt x="308545" y="498036"/>
+                  </a:lnTo>
+                  <a:lnTo>
+                    <a:pt x="308545" y="679927"/>
+                  </a:lnTo>
+                  <a:lnTo>
+                    <a:pt x="154273" y="582806"/>
+                  </a:lnTo>
+                  <a:lnTo>
+                    <a:pt x="0" y="679927"/>
+                  </a:lnTo>
+                  <a:lnTo>
+                    <a:pt x="0" y="498036"/>
+                  </a:lnTo>
+                  <a:lnTo>
+                    <a:pt x="0" y="462723"/>
+                  </a:lnTo>
+                  <a:lnTo>
+                    <a:pt x="0" y="366713"/>
+                  </a:lnTo>
+                  <a:lnTo>
+                    <a:pt x="0" y="144463"/>
+                  </a:lnTo>
+                  <a:lnTo>
+                    <a:pt x="0" y="131323"/>
+                  </a:lnTo>
+                  <a:lnTo>
+                    <a:pt x="2653" y="131323"/>
+                  </a:lnTo>
+                  <a:lnTo>
+                    <a:pt x="11353" y="88232"/>
+                  </a:lnTo>
+                  <a:cubicBezTo>
+                    <a:pt x="33283" y="36382"/>
+                    <a:pt x="84625" y="0"/>
+                    <a:pt x="144463" y="0"/>
+                  </a:cubicBezTo>
+                  <a:close/>
+                </a:path>
+              </a:pathLst>
+            </a:custGeom>
+            <a:solidFill>
+              <a:srgbClr val="00B0F0"/>
+            </a:solidFill>
+            <a:ln w="38100">
+              <a:solidFill>
+                <a:schemeClr val="tx1">
+                  <a:lumMod val="95000"/>
+                  <a:lumOff val="5000"/>
+                </a:schemeClr>
+              </a:solidFill>
+            </a:ln>
+          </p:spPr>
+          <p:style>
+            <a:lnRef idx="2">
+              <a:schemeClr val="accent1">
+                <a:shade val="50000"/>
+              </a:schemeClr>
+            </a:lnRef>
+            <a:fillRef idx="1">
+              <a:schemeClr val="accent1"/>
+            </a:fillRef>
+            <a:effectRef idx="0">
+              <a:schemeClr val="accent1"/>
+            </a:effectRef>
+            <a:fontRef idx="minor">
+              <a:schemeClr val="lt1"/>
+            </a:fontRef>
+          </p:style>
+          <p:txBody>
+            <a:bodyPr wrap="square" rtlCol="0" anchor="ctr">
+              <a:noAutofit/>
+            </a:bodyPr>
+            <a:lstStyle/>
+            <a:p>
+              <a:pPr algn="ctr">
+                <a:defRPr/>
+              </a:pPr>
+              <a:endParaRPr lang="ko-KR" altLang="en-US">
+                <a:solidFill>
+                  <a:prstClr val="black"/>
+                </a:solidFill>
+              </a:endParaRPr>
+            </a:p>
+          </p:txBody>
+        </p:sp>
+      </p:grpSp>
+      <p:sp>
+        <p:nvSpPr>
           <p:cNvPr id="3" name="TextBox 2">
             <a:extLst>
               <a:ext uri="{FF2B5EF4-FFF2-40B4-BE49-F238E27FC236}">
@@ -9962,7 +12396,7 @@
 </p:sld>
 </file>
 
-<file path=ppt/slides/slide14.xml><?xml version="1.0" encoding="utf-8"?>
+<file path=ppt/slides/slide16.xml><?xml version="1.0" encoding="utf-8"?>
 <p:sld xmlns:a="http://schemas.openxmlformats.org/drawingml/2006/main" xmlns:r="http://schemas.openxmlformats.org/officeDocument/2006/relationships" xmlns:p="http://schemas.openxmlformats.org/presentationml/2006/main">
   <p:cSld>
     <p:bg>
@@ -11193,7 +13627,7 @@
 </p:sld>
 </file>
 
-<file path=ppt/slides/slide15.xml><?xml version="1.0" encoding="utf-8"?>
+<file path=ppt/slides/slide17.xml><?xml version="1.0" encoding="utf-8"?>
 <p:sld xmlns:a="http://schemas.openxmlformats.org/drawingml/2006/main" xmlns:r="http://schemas.openxmlformats.org/officeDocument/2006/relationships" xmlns:p="http://schemas.openxmlformats.org/presentationml/2006/main">
   <p:cSld>
     <p:bg>

</xml_diff>